<commit_message>
Smart PDF work in progress
</commit_message>
<xml_diff>
--- a/powerpoint/SmartPDF/Don't Just PDF,.pptx
+++ b/powerpoint/SmartPDF/Don't Just PDF,.pptx
@@ -5,10 +5,10 @@
     <p:sldMasterId id="2147483660" r:id="rId2"/>
   </p:sldMasterIdLst>
   <p:notesMasterIdLst>
-    <p:notesMasterId r:id="rId18"/>
+    <p:notesMasterId r:id="rId19"/>
   </p:notesMasterIdLst>
   <p:handoutMasterIdLst>
-    <p:handoutMasterId r:id="rId19"/>
+    <p:handoutMasterId r:id="rId20"/>
   </p:handoutMasterIdLst>
   <p:sldIdLst>
     <p:sldId id="264" r:id="rId3"/>
@@ -18,14 +18,15 @@
     <p:sldId id="282" r:id="rId7"/>
     <p:sldId id="283" r:id="rId8"/>
     <p:sldId id="284" r:id="rId9"/>
-    <p:sldId id="277" r:id="rId10"/>
-    <p:sldId id="278" r:id="rId11"/>
-    <p:sldId id="279" r:id="rId12"/>
-    <p:sldId id="268" r:id="rId13"/>
-    <p:sldId id="269" r:id="rId14"/>
-    <p:sldId id="270" r:id="rId15"/>
-    <p:sldId id="280" r:id="rId16"/>
-    <p:sldId id="274" r:id="rId17"/>
+    <p:sldId id="285" r:id="rId10"/>
+    <p:sldId id="277" r:id="rId11"/>
+    <p:sldId id="278" r:id="rId12"/>
+    <p:sldId id="279" r:id="rId13"/>
+    <p:sldId id="268" r:id="rId14"/>
+    <p:sldId id="269" r:id="rId15"/>
+    <p:sldId id="270" r:id="rId16"/>
+    <p:sldId id="280" r:id="rId17"/>
+    <p:sldId id="274" r:id="rId18"/>
   </p:sldIdLst>
   <p:sldSz cx="12188825" cy="6858000"/>
   <p:notesSz cx="6858000" cy="9144000"/>
@@ -4037,7 +4038,7 @@
                   <a:schemeClr val="tx2"/>
                 </a:solidFill>
               </a:rPr>
-              <a:t>8/23/2016</a:t>
+              <a:t>8/25/2016</a:t>
             </a:fld>
             <a:endParaRPr>
               <a:solidFill>
@@ -4227,7 +4228,7 @@
             <a:fld id="{F95CF31C-F757-429C-A789-86504F04C3BE}" type="datetimeFigureOut">
               <a:rPr lang="en-US"/>
               <a:pPr/>
-              <a:t>8/23/2016</a:t>
+              <a:t>8/25/2016</a:t>
             </a:fld>
             <a:endParaRPr/>
           </a:p>
@@ -4827,7 +4828,7 @@
           <a:p>
             <a:fld id="{7AECB6C2-1084-4AED-A74A-DF028B0094EA}" type="datetimeFigureOut">
               <a:rPr lang="en-US"/>
-              <a:t>8/23/2016</a:t>
+              <a:t>8/25/2016</a:t>
             </a:fld>
             <a:endParaRPr/>
           </a:p>
@@ -5019,7 +5020,7 @@
           <a:p>
             <a:fld id="{7AECB6C2-1084-4AED-A74A-DF028B0094EA}" type="datetimeFigureOut">
               <a:rPr lang="en-US"/>
-              <a:t>8/23/2016</a:t>
+              <a:t>8/25/2016</a:t>
             </a:fld>
             <a:endParaRPr/>
           </a:p>
@@ -5217,7 +5218,7 @@
           <a:p>
             <a:fld id="{8B5A30F4-0B4E-4E4B-BC36-C30CD13F4E17}" type="datetimeFigureOut">
               <a:rPr lang="en-US"/>
-              <a:t>8/23/2016</a:t>
+              <a:t>8/25/2016</a:t>
             </a:fld>
             <a:endParaRPr/>
           </a:p>
@@ -5733,7 +5734,7 @@
           <a:p>
             <a:fld id="{2DD204D1-F9BD-4643-8480-6EA41EB484F1}" type="datetimeFigureOut">
               <a:rPr lang="en-US"/>
-              <a:t>8/23/2016</a:t>
+              <a:t>8/25/2016</a:t>
             </a:fld>
             <a:endParaRPr/>
           </a:p>
@@ -6181,7 +6182,7 @@
           <a:p>
             <a:fld id="{2DD204D1-F9BD-4643-8480-6EA41EB484F1}" type="datetimeFigureOut">
               <a:rPr lang="en-US"/>
-              <a:t>8/23/2016</a:t>
+              <a:t>8/25/2016</a:t>
             </a:fld>
             <a:endParaRPr/>
           </a:p>
@@ -6311,7 +6312,7 @@
           <a:p>
             <a:fld id="{2DD204D1-F9BD-4643-8480-6EA41EB484F1}" type="datetimeFigureOut">
               <a:rPr lang="en-US"/>
-              <a:t>8/23/2016</a:t>
+              <a:t>8/25/2016</a:t>
             </a:fld>
             <a:endParaRPr/>
           </a:p>
@@ -6418,7 +6419,7 @@
           <a:p>
             <a:fld id="{2DD204D1-F9BD-4643-8480-6EA41EB484F1}" type="datetimeFigureOut">
               <a:rPr lang="en-US"/>
-              <a:t>8/23/2016</a:t>
+              <a:t>8/25/2016</a:t>
             </a:fld>
             <a:endParaRPr/>
           </a:p>
@@ -6775,7 +6776,7 @@
           <a:p>
             <a:fld id="{126BF754-515F-40B9-8D24-D54D5825B3D0}" type="datetimeFigureOut">
               <a:rPr lang="en-US"/>
-              <a:t>8/23/2016</a:t>
+              <a:t>8/25/2016</a:t>
             </a:fld>
             <a:endParaRPr/>
           </a:p>
@@ -7112,7 +7113,7 @@
           <a:p>
             <a:fld id="{126BF754-515F-40B9-8D24-D54D5825B3D0}" type="datetimeFigureOut">
               <a:rPr lang="en-US"/>
-              <a:t>8/23/2016</a:t>
+              <a:t>8/25/2016</a:t>
             </a:fld>
             <a:endParaRPr/>
           </a:p>
@@ -7407,7 +7408,7 @@
             <a:fld id="{2DD204D1-F9BD-4643-8480-6EA41EB484F1}" type="datetimeFigureOut">
               <a:rPr lang="en-US"/>
               <a:pPr/>
-              <a:t>8/23/2016</a:t>
+              <a:t>8/25/2016</a:t>
             </a:fld>
             <a:endParaRPr/>
           </a:p>
@@ -7853,61 +7854,6 @@
           <a:chExt cx="0" cy="0"/>
         </a:xfrm>
       </p:grpSpPr>
-      <p:sp>
-        <p:nvSpPr>
-          <p:cNvPr id="2" name="Title 1"/>
-          <p:cNvSpPr>
-            <a:spLocks noGrp="1"/>
-          </p:cNvSpPr>
-          <p:nvPr>
-            <p:ph type="ctrTitle"/>
-          </p:nvPr>
-        </p:nvSpPr>
-        <p:spPr>
-          <a:xfrm>
-            <a:off x="4964298" y="1524000"/>
-            <a:ext cx="7008574" cy="3298825"/>
-          </a:xfrm>
-        </p:spPr>
-        <p:txBody>
-          <a:bodyPr/>
-          <a:lstStyle/>
-          <a:p>
-            <a:r>
-              <a:rPr lang="en-US" b="1" dirty="0"/>
-              <a:t>Don't Just PDF, "Smart" PDF!</a:t>
-            </a:r>
-            <a:endParaRPr lang="en-US" dirty="0"/>
-          </a:p>
-        </p:txBody>
-      </p:sp>
-      <p:sp>
-        <p:nvSpPr>
-          <p:cNvPr id="3" name="Subtitle 2"/>
-          <p:cNvSpPr>
-            <a:spLocks noGrp="1"/>
-          </p:cNvSpPr>
-          <p:nvPr>
-            <p:ph type="subTitle" idx="1"/>
-          </p:nvPr>
-        </p:nvSpPr>
-        <p:spPr>
-          <a:xfrm>
-            <a:off x="4964298" y="4882832"/>
-            <a:ext cx="7008574" cy="1244600"/>
-          </a:xfrm>
-        </p:spPr>
-        <p:txBody>
-          <a:bodyPr/>
-          <a:lstStyle/>
-          <a:p>
-            <a:r>
-              <a:rPr lang="en-US" dirty="0"/>
-              <a:t>Move your PDF to next level</a:t>
-            </a:r>
-          </a:p>
-        </p:txBody>
-      </p:sp>
       <p:pic>
         <p:nvPicPr>
           <p:cNvPr id="5" name="Picture 4"/>
@@ -7930,14 +7876,69 @@
         </p:blipFill>
         <p:spPr>
           <a:xfrm>
-            <a:off x="5942012" y="381000"/>
-            <a:ext cx="2743200" cy="2743200"/>
+            <a:off x="-1220788" y="-152400"/>
+            <a:ext cx="7543800" cy="7543800"/>
           </a:xfrm>
           <a:prstGeom prst="rect">
             <a:avLst/>
           </a:prstGeom>
         </p:spPr>
       </p:pic>
+      <p:sp>
+        <p:nvSpPr>
+          <p:cNvPr id="2" name="Title 1"/>
+          <p:cNvSpPr>
+            <a:spLocks noGrp="1"/>
+          </p:cNvSpPr>
+          <p:nvPr>
+            <p:ph type="ctrTitle"/>
+          </p:nvPr>
+        </p:nvSpPr>
+        <p:spPr>
+          <a:xfrm>
+            <a:off x="5345298" y="1524000"/>
+            <a:ext cx="6006914" cy="3298825"/>
+          </a:xfrm>
+        </p:spPr>
+        <p:txBody>
+          <a:bodyPr/>
+          <a:lstStyle/>
+          <a:p>
+            <a:r>
+              <a:rPr lang="en-US" b="1" dirty="0"/>
+              <a:t>Don't Just PDF, "Smart" PDF!</a:t>
+            </a:r>
+            <a:endParaRPr lang="en-US" dirty="0"/>
+          </a:p>
+        </p:txBody>
+      </p:sp>
+      <p:sp>
+        <p:nvSpPr>
+          <p:cNvPr id="3" name="Subtitle 2"/>
+          <p:cNvSpPr>
+            <a:spLocks noGrp="1"/>
+          </p:cNvSpPr>
+          <p:nvPr>
+            <p:ph type="subTitle" idx="1"/>
+          </p:nvPr>
+        </p:nvSpPr>
+        <p:spPr>
+          <a:xfrm>
+            <a:off x="5421498" y="4882832"/>
+            <a:ext cx="6387914" cy="1244600"/>
+          </a:xfrm>
+        </p:spPr>
+        <p:txBody>
+          <a:bodyPr/>
+          <a:lstStyle/>
+          <a:p>
+            <a:r>
+              <a:rPr lang="en-US" dirty="0"/>
+              <a:t>Move your PDF to next level</a:t>
+            </a:r>
+          </a:p>
+        </p:txBody>
+      </p:sp>
     </p:spTree>
     <p:extLst>
       <p:ext uri="{BB962C8B-B14F-4D97-AF65-F5344CB8AC3E}">
@@ -7964,1718 +7965,6 @@
 </file>
 
 <file path=ppt/slides/slide10.xml><?xml version="1.0" encoding="utf-8"?>
-<p:sld xmlns:a="http://schemas.openxmlformats.org/drawingml/2006/main" xmlns:r="http://schemas.openxmlformats.org/officeDocument/2006/relationships" xmlns:p="http://schemas.openxmlformats.org/presentationml/2006/main">
-  <p:cSld>
-    <p:spTree>
-      <p:nvGrpSpPr>
-        <p:cNvPr id="1" name=""/>
-        <p:cNvGrpSpPr/>
-        <p:nvPr/>
-      </p:nvGrpSpPr>
-      <p:grpSpPr>
-        <a:xfrm>
-          <a:off x="0" y="0"/>
-          <a:ext cx="0" cy="0"/>
-          <a:chOff x="0" y="0"/>
-          <a:chExt cx="0" cy="0"/>
-        </a:xfrm>
-      </p:grpSpPr>
-      <p:sp>
-        <p:nvSpPr>
-          <p:cNvPr id="2" name="Title 1"/>
-          <p:cNvSpPr>
-            <a:spLocks noGrp="1"/>
-          </p:cNvSpPr>
-          <p:nvPr>
-            <p:ph type="title"/>
-          </p:nvPr>
-        </p:nvSpPr>
-        <p:spPr/>
-        <p:txBody>
-          <a:bodyPr/>
-          <a:lstStyle/>
-          <a:p>
-            <a:r>
-              <a:rPr lang="en-US"/>
-              <a:t>Two Content Layout with SmartArt</a:t>
-            </a:r>
-            <a:endParaRPr lang="en-US" dirty="0"/>
-          </a:p>
-        </p:txBody>
-      </p:sp>
-      <p:graphicFrame>
-        <p:nvGraphicFramePr>
-          <p:cNvPr id="4" name="Content Placeholder 3" descr="Vertical Bullet List" title="SmartArt"/>
-          <p:cNvGraphicFramePr>
-            <a:graphicFrameLocks noGrp="1"/>
-          </p:cNvGraphicFramePr>
-          <p:nvPr>
-            <p:ph sz="half" idx="1"/>
-            <p:extLst>
-              <p:ext uri="{D42A27DB-BD31-4B8C-83A1-F6EECF244321}">
-                <p14:modId xmlns:p14="http://schemas.microsoft.com/office/powerpoint/2010/main" val="793007413"/>
-              </p:ext>
-            </p:extLst>
-          </p:nvPr>
-        </p:nvGraphicFramePr>
-        <p:xfrm>
-          <a:off x="1117600" y="1701800"/>
-          <a:ext cx="4976813" cy="4470400"/>
-        </p:xfrm>
-        <a:graphic>
-          <a:graphicData uri="http://schemas.openxmlformats.org/drawingml/2006/diagram">
-            <dgm:relIds xmlns:dgm="http://schemas.openxmlformats.org/drawingml/2006/diagram" xmlns:r="http://schemas.openxmlformats.org/officeDocument/2006/relationships" r:dm="rId2" r:lo="rId3" r:qs="rId4" r:cs="rId5"/>
-          </a:graphicData>
-        </a:graphic>
-      </p:graphicFrame>
-      <p:sp>
-        <p:nvSpPr>
-          <p:cNvPr id="6" name="Content Placeholder 5"/>
-          <p:cNvSpPr>
-            <a:spLocks noGrp="1"/>
-          </p:cNvSpPr>
-          <p:nvPr>
-            <p:ph sz="half" idx="2"/>
-          </p:nvPr>
-        </p:nvSpPr>
-        <p:spPr/>
-        <p:txBody>
-          <a:bodyPr/>
-          <a:lstStyle/>
-          <a:p>
-            <a:r>
-              <a:rPr lang="en-US"/>
-              <a:t>First bullet point here</a:t>
-            </a:r>
-          </a:p>
-          <a:p>
-            <a:r>
-              <a:rPr lang="en-US"/>
-              <a:t>Second bullet point here</a:t>
-            </a:r>
-          </a:p>
-          <a:p>
-            <a:r>
-              <a:rPr lang="en-US"/>
-              <a:t>Third bullet point here</a:t>
-            </a:r>
-            <a:endParaRPr lang="en-US" dirty="0"/>
-          </a:p>
-        </p:txBody>
-      </p:sp>
-    </p:spTree>
-    <p:extLst>
-      <p:ext uri="{BB962C8B-B14F-4D97-AF65-F5344CB8AC3E}">
-        <p14:creationId xmlns:p14="http://schemas.microsoft.com/office/powerpoint/2010/main" val="13403576"/>
-      </p:ext>
-    </p:extLst>
-  </p:cSld>
-  <p:clrMapOvr>
-    <a:masterClrMapping/>
-  </p:clrMapOvr>
-  <mc:AlternateContent xmlns:mc="http://schemas.openxmlformats.org/markup-compatibility/2006" xmlns:p14="http://schemas.microsoft.com/office/powerpoint/2010/main">
-    <mc:Choice Requires="p14">
-      <p:transition spd="med" p14:dur="700">
-        <p:fade/>
-      </p:transition>
-    </mc:Choice>
-    <mc:Fallback xmlns="">
-      <p:transition spd="med">
-        <p:fade/>
-      </p:transition>
-    </mc:Fallback>
-  </mc:AlternateContent>
-</p:sld>
-</file>
-
-<file path=ppt/slides/slide11.xml><?xml version="1.0" encoding="utf-8"?>
-<p:sld xmlns:a="http://schemas.openxmlformats.org/drawingml/2006/main" xmlns:r="http://schemas.openxmlformats.org/officeDocument/2006/relationships" xmlns:p="http://schemas.openxmlformats.org/presentationml/2006/main">
-  <p:cSld>
-    <p:spTree>
-      <p:nvGrpSpPr>
-        <p:cNvPr id="1" name=""/>
-        <p:cNvGrpSpPr/>
-        <p:nvPr/>
-      </p:nvGrpSpPr>
-      <p:grpSpPr>
-        <a:xfrm>
-          <a:off x="0" y="0"/>
-          <a:ext cx="0" cy="0"/>
-          <a:chOff x="0" y="0"/>
-          <a:chExt cx="0" cy="0"/>
-        </a:xfrm>
-      </p:grpSpPr>
-      <p:sp>
-        <p:nvSpPr>
-          <p:cNvPr id="2" name="Title 1"/>
-          <p:cNvSpPr>
-            <a:spLocks noGrp="1"/>
-          </p:cNvSpPr>
-          <p:nvPr>
-            <p:ph type="title"/>
-          </p:nvPr>
-        </p:nvSpPr>
-        <p:spPr/>
-        <p:txBody>
-          <a:bodyPr/>
-          <a:lstStyle/>
-          <a:p>
-            <a:endParaRPr lang="en-US" dirty="0"/>
-          </a:p>
-        </p:txBody>
-      </p:sp>
-      <p:sp>
-        <p:nvSpPr>
-          <p:cNvPr id="5" name="Text Placeholder 4"/>
-          <p:cNvSpPr>
-            <a:spLocks noGrp="1"/>
-          </p:cNvSpPr>
-          <p:nvPr>
-            <p:ph type="body" idx="1"/>
-          </p:nvPr>
-        </p:nvSpPr>
-        <p:spPr/>
-        <p:txBody>
-          <a:bodyPr/>
-          <a:lstStyle/>
-          <a:p>
-            <a:endParaRPr lang="en-US" dirty="0"/>
-          </a:p>
-        </p:txBody>
-      </p:sp>
-      <p:sp>
-        <p:nvSpPr>
-          <p:cNvPr id="3" name="Content Placeholder 2"/>
-          <p:cNvSpPr>
-            <a:spLocks noGrp="1"/>
-          </p:cNvSpPr>
-          <p:nvPr>
-            <p:ph sz="half" idx="2"/>
-          </p:nvPr>
-        </p:nvSpPr>
-        <p:spPr/>
-        <p:txBody>
-          <a:bodyPr/>
-          <a:lstStyle/>
-          <a:p>
-            <a:endParaRPr lang="en-US" dirty="0"/>
-          </a:p>
-        </p:txBody>
-      </p:sp>
-      <p:sp>
-        <p:nvSpPr>
-          <p:cNvPr id="6" name="Text Placeholder 5"/>
-          <p:cNvSpPr>
-            <a:spLocks noGrp="1"/>
-          </p:cNvSpPr>
-          <p:nvPr>
-            <p:ph type="body" sz="quarter" idx="3"/>
-          </p:nvPr>
-        </p:nvSpPr>
-        <p:spPr/>
-        <p:txBody>
-          <a:bodyPr/>
-          <a:lstStyle/>
-          <a:p>
-            <a:endParaRPr lang="en-US" dirty="0"/>
-          </a:p>
-        </p:txBody>
-      </p:sp>
-      <p:sp>
-        <p:nvSpPr>
-          <p:cNvPr id="4" name="Content Placeholder 3"/>
-          <p:cNvSpPr>
-            <a:spLocks noGrp="1"/>
-          </p:cNvSpPr>
-          <p:nvPr>
-            <p:ph sz="quarter" idx="4"/>
-          </p:nvPr>
-        </p:nvSpPr>
-        <p:spPr/>
-        <p:txBody>
-          <a:bodyPr/>
-          <a:lstStyle/>
-          <a:p>
-            <a:endParaRPr lang="en-US" dirty="0"/>
-          </a:p>
-        </p:txBody>
-      </p:sp>
-    </p:spTree>
-    <p:extLst>
-      <p:ext uri="{BB962C8B-B14F-4D97-AF65-F5344CB8AC3E}">
-        <p14:creationId xmlns:p14="http://schemas.microsoft.com/office/powerpoint/2010/main" val="3296948863"/>
-      </p:ext>
-    </p:extLst>
-  </p:cSld>
-  <p:clrMapOvr>
-    <a:masterClrMapping/>
-  </p:clrMapOvr>
-  <mc:AlternateContent xmlns:mc="http://schemas.openxmlformats.org/markup-compatibility/2006" xmlns:p14="http://schemas.microsoft.com/office/powerpoint/2010/main">
-    <mc:Choice Requires="p14">
-      <p:transition spd="med" p14:dur="700">
-        <p:fade/>
-      </p:transition>
-    </mc:Choice>
-    <mc:Fallback xmlns="">
-      <p:transition spd="med">
-        <p:fade/>
-      </p:transition>
-    </mc:Fallback>
-  </mc:AlternateContent>
-</p:sld>
-</file>
-
-<file path=ppt/slides/slide12.xml><?xml version="1.0" encoding="utf-8"?>
-<p:sld xmlns:a="http://schemas.openxmlformats.org/drawingml/2006/main" xmlns:r="http://schemas.openxmlformats.org/officeDocument/2006/relationships" xmlns:p="http://schemas.openxmlformats.org/presentationml/2006/main">
-  <p:cSld>
-    <p:spTree>
-      <p:nvGrpSpPr>
-        <p:cNvPr id="1" name=""/>
-        <p:cNvGrpSpPr/>
-        <p:nvPr/>
-      </p:nvGrpSpPr>
-      <p:grpSpPr>
-        <a:xfrm>
-          <a:off x="0" y="0"/>
-          <a:ext cx="0" cy="0"/>
-          <a:chOff x="0" y="0"/>
-          <a:chExt cx="0" cy="0"/>
-        </a:xfrm>
-      </p:grpSpPr>
-      <p:sp>
-        <p:nvSpPr>
-          <p:cNvPr id="2" name="Title 1"/>
-          <p:cNvSpPr>
-            <a:spLocks noGrp="1"/>
-          </p:cNvSpPr>
-          <p:nvPr>
-            <p:ph type="title"/>
-          </p:nvPr>
-        </p:nvSpPr>
-        <p:spPr/>
-        <p:txBody>
-          <a:bodyPr/>
-          <a:lstStyle/>
-          <a:p>
-            <a:endParaRPr lang="en-US" dirty="0"/>
-          </a:p>
-        </p:txBody>
-      </p:sp>
-    </p:spTree>
-    <p:extLst>
-      <p:ext uri="{BB962C8B-B14F-4D97-AF65-F5344CB8AC3E}">
-        <p14:creationId xmlns:p14="http://schemas.microsoft.com/office/powerpoint/2010/main" val="1653943558"/>
-      </p:ext>
-    </p:extLst>
-  </p:cSld>
-  <p:clrMapOvr>
-    <a:masterClrMapping/>
-  </p:clrMapOvr>
-  <mc:AlternateContent xmlns:mc="http://schemas.openxmlformats.org/markup-compatibility/2006" xmlns:p14="http://schemas.microsoft.com/office/powerpoint/2010/main">
-    <mc:Choice Requires="p14">
-      <p:transition spd="med" p14:dur="700">
-        <p:fade/>
-      </p:transition>
-    </mc:Choice>
-    <mc:Fallback xmlns="">
-      <p:transition spd="med">
-        <p:fade/>
-      </p:transition>
-    </mc:Fallback>
-  </mc:AlternateContent>
-</p:sld>
-</file>
-
-<file path=ppt/slides/slide13.xml><?xml version="1.0" encoding="utf-8"?>
-<p:sld xmlns:a="http://schemas.openxmlformats.org/drawingml/2006/main" xmlns:r="http://schemas.openxmlformats.org/officeDocument/2006/relationships" xmlns:p="http://schemas.openxmlformats.org/presentationml/2006/main">
-  <p:cSld>
-    <p:spTree>
-      <p:nvGrpSpPr>
-        <p:cNvPr id="1" name=""/>
-        <p:cNvGrpSpPr/>
-        <p:nvPr/>
-      </p:nvGrpSpPr>
-      <p:grpSpPr>
-        <a:xfrm>
-          <a:off x="0" y="0"/>
-          <a:ext cx="0" cy="0"/>
-          <a:chOff x="0" y="0"/>
-          <a:chExt cx="0" cy="0"/>
-        </a:xfrm>
-      </p:grpSpPr>
-    </p:spTree>
-    <p:extLst>
-      <p:ext uri="{BB962C8B-B14F-4D97-AF65-F5344CB8AC3E}">
-        <p14:creationId xmlns:p14="http://schemas.microsoft.com/office/powerpoint/2010/main" val="3030984589"/>
-      </p:ext>
-    </p:extLst>
-  </p:cSld>
-  <p:clrMapOvr>
-    <a:masterClrMapping/>
-  </p:clrMapOvr>
-  <mc:AlternateContent xmlns:mc="http://schemas.openxmlformats.org/markup-compatibility/2006" xmlns:p14="http://schemas.microsoft.com/office/powerpoint/2010/main">
-    <mc:Choice Requires="p14">
-      <p:transition spd="med" p14:dur="700">
-        <p:fade/>
-      </p:transition>
-    </mc:Choice>
-    <mc:Fallback xmlns="">
-      <p:transition spd="med">
-        <p:fade/>
-      </p:transition>
-    </mc:Fallback>
-  </mc:AlternateContent>
-</p:sld>
-</file>
-
-<file path=ppt/slides/slide14.xml><?xml version="1.0" encoding="utf-8"?>
-<p:sld xmlns:a="http://schemas.openxmlformats.org/drawingml/2006/main" xmlns:r="http://schemas.openxmlformats.org/officeDocument/2006/relationships" xmlns:p="http://schemas.openxmlformats.org/presentationml/2006/main">
-  <p:cSld>
-    <p:spTree>
-      <p:nvGrpSpPr>
-        <p:cNvPr id="1" name=""/>
-        <p:cNvGrpSpPr/>
-        <p:nvPr/>
-      </p:nvGrpSpPr>
-      <p:grpSpPr>
-        <a:xfrm>
-          <a:off x="0" y="0"/>
-          <a:ext cx="0" cy="0"/>
-          <a:chOff x="0" y="0"/>
-          <a:chExt cx="0" cy="0"/>
-        </a:xfrm>
-      </p:grpSpPr>
-      <p:sp>
-        <p:nvSpPr>
-          <p:cNvPr id="2" name="Title 1"/>
-          <p:cNvSpPr>
-            <a:spLocks noGrp="1"/>
-          </p:cNvSpPr>
-          <p:nvPr>
-            <p:ph type="title"/>
-          </p:nvPr>
-        </p:nvSpPr>
-        <p:spPr/>
-        <p:txBody>
-          <a:bodyPr/>
-          <a:lstStyle/>
-          <a:p>
-            <a:endParaRPr lang="en-US"/>
-          </a:p>
-        </p:txBody>
-      </p:sp>
-      <p:sp>
-        <p:nvSpPr>
-          <p:cNvPr id="3" name="Content Placeholder 2"/>
-          <p:cNvSpPr>
-            <a:spLocks noGrp="1"/>
-          </p:cNvSpPr>
-          <p:nvPr>
-            <p:ph idx="1"/>
-          </p:nvPr>
-        </p:nvSpPr>
-        <p:spPr/>
-        <p:txBody>
-          <a:bodyPr/>
-          <a:lstStyle/>
-          <a:p>
-            <a:endParaRPr lang="en-US"/>
-          </a:p>
-        </p:txBody>
-      </p:sp>
-      <p:sp>
-        <p:nvSpPr>
-          <p:cNvPr id="4" name="Text Placeholder 3"/>
-          <p:cNvSpPr>
-            <a:spLocks noGrp="1"/>
-          </p:cNvSpPr>
-          <p:nvPr>
-            <p:ph type="body" sz="half" idx="2"/>
-          </p:nvPr>
-        </p:nvSpPr>
-        <p:spPr/>
-        <p:txBody>
-          <a:bodyPr/>
-          <a:lstStyle/>
-          <a:p>
-            <a:endParaRPr lang="en-US"/>
-          </a:p>
-        </p:txBody>
-      </p:sp>
-    </p:spTree>
-    <p:extLst>
-      <p:ext uri="{BB962C8B-B14F-4D97-AF65-F5344CB8AC3E}">
-        <p14:creationId xmlns:p14="http://schemas.microsoft.com/office/powerpoint/2010/main" val="1750688946"/>
-      </p:ext>
-    </p:extLst>
-  </p:cSld>
-  <p:clrMapOvr>
-    <a:masterClrMapping/>
-  </p:clrMapOvr>
-  <mc:AlternateContent xmlns:mc="http://schemas.openxmlformats.org/markup-compatibility/2006" xmlns:p14="http://schemas.microsoft.com/office/powerpoint/2010/main">
-    <mc:Choice Requires="p14">
-      <p:transition spd="med" p14:dur="700">
-        <p:fade/>
-      </p:transition>
-    </mc:Choice>
-    <mc:Fallback xmlns="">
-      <p:transition spd="med">
-        <p:fade/>
-      </p:transition>
-    </mc:Fallback>
-  </mc:AlternateContent>
-</p:sld>
-</file>
-
-<file path=ppt/slides/slide15.xml><?xml version="1.0" encoding="utf-8"?>
-<p:sld xmlns:a="http://schemas.openxmlformats.org/drawingml/2006/main" xmlns:r="http://schemas.openxmlformats.org/officeDocument/2006/relationships" xmlns:p="http://schemas.openxmlformats.org/presentationml/2006/main">
-  <p:cSld>
-    <p:spTree>
-      <p:nvGrpSpPr>
-        <p:cNvPr id="1" name=""/>
-        <p:cNvGrpSpPr/>
-        <p:nvPr/>
-      </p:nvGrpSpPr>
-      <p:grpSpPr>
-        <a:xfrm>
-          <a:off x="0" y="0"/>
-          <a:ext cx="0" cy="0"/>
-          <a:chOff x="0" y="0"/>
-          <a:chExt cx="0" cy="0"/>
-        </a:xfrm>
-      </p:grpSpPr>
-      <p:sp>
-        <p:nvSpPr>
-          <p:cNvPr id="2" name="Title 1"/>
-          <p:cNvSpPr>
-            <a:spLocks noGrp="1"/>
-          </p:cNvSpPr>
-          <p:nvPr>
-            <p:ph type="title"/>
-          </p:nvPr>
-        </p:nvSpPr>
-        <p:spPr/>
-        <p:txBody>
-          <a:bodyPr/>
-          <a:lstStyle/>
-          <a:p>
-            <a:endParaRPr lang="en-US" dirty="0"/>
-          </a:p>
-        </p:txBody>
-      </p:sp>
-      <p:sp>
-        <p:nvSpPr>
-          <p:cNvPr id="4" name="Text Placeholder 3"/>
-          <p:cNvSpPr>
-            <a:spLocks noGrp="1"/>
-          </p:cNvSpPr>
-          <p:nvPr>
-            <p:ph type="body" sz="half" idx="2"/>
-          </p:nvPr>
-        </p:nvSpPr>
-        <p:spPr/>
-        <p:txBody>
-          <a:bodyPr/>
-          <a:lstStyle/>
-          <a:p>
-            <a:endParaRPr lang="en-US" dirty="0"/>
-          </a:p>
-        </p:txBody>
-      </p:sp>
-      <p:sp>
-        <p:nvSpPr>
-          <p:cNvPr id="3" name="Picture Placeholder 2"/>
-          <p:cNvSpPr>
-            <a:spLocks noGrp="1"/>
-          </p:cNvSpPr>
-          <p:nvPr>
-            <p:ph type="pic" idx="1"/>
-          </p:nvPr>
-        </p:nvSpPr>
-        <p:spPr/>
-      </p:sp>
-    </p:spTree>
-    <p:extLst>
-      <p:ext uri="{BB962C8B-B14F-4D97-AF65-F5344CB8AC3E}">
-        <p14:creationId xmlns:p14="http://schemas.microsoft.com/office/powerpoint/2010/main" val="3761302454"/>
-      </p:ext>
-    </p:extLst>
-  </p:cSld>
-  <p:clrMapOvr>
-    <a:masterClrMapping/>
-  </p:clrMapOvr>
-  <mc:AlternateContent xmlns:mc="http://schemas.openxmlformats.org/markup-compatibility/2006" xmlns:p14="http://schemas.microsoft.com/office/powerpoint/2010/main">
-    <mc:Choice Requires="p14">
-      <p:transition spd="med" p14:dur="700">
-        <p:fade/>
-      </p:transition>
-    </mc:Choice>
-    <mc:Fallback xmlns="">
-      <p:transition spd="med">
-        <p:fade/>
-      </p:transition>
-    </mc:Fallback>
-  </mc:AlternateContent>
-</p:sld>
-</file>
-
-<file path=ppt/slides/slide2.xml><?xml version="1.0" encoding="utf-8"?>
-<p:sld xmlns:a="http://schemas.openxmlformats.org/drawingml/2006/main" xmlns:r="http://schemas.openxmlformats.org/officeDocument/2006/relationships" xmlns:p="http://schemas.openxmlformats.org/presentationml/2006/main">
-  <p:cSld>
-    <p:spTree>
-      <p:nvGrpSpPr>
-        <p:cNvPr id="1" name=""/>
-        <p:cNvGrpSpPr/>
-        <p:nvPr/>
-      </p:nvGrpSpPr>
-      <p:grpSpPr>
-        <a:xfrm>
-          <a:off x="0" y="0"/>
-          <a:ext cx="0" cy="0"/>
-          <a:chOff x="0" y="0"/>
-          <a:chExt cx="0" cy="0"/>
-        </a:xfrm>
-      </p:grpSpPr>
-      <p:sp>
-        <p:nvSpPr>
-          <p:cNvPr id="13" name="Title 12"/>
-          <p:cNvSpPr>
-            <a:spLocks noGrp="1"/>
-          </p:cNvSpPr>
-          <p:nvPr>
-            <p:ph type="title"/>
-          </p:nvPr>
-        </p:nvSpPr>
-        <p:spPr/>
-        <p:txBody>
-          <a:bodyPr/>
-          <a:lstStyle/>
-          <a:p>
-            <a:r>
-              <a:rPr lang="en-US" dirty="0"/>
-              <a:t>Who am I</a:t>
-            </a:r>
-          </a:p>
-        </p:txBody>
-      </p:sp>
-      <p:sp>
-        <p:nvSpPr>
-          <p:cNvPr id="14" name="Content Placeholder 13"/>
-          <p:cNvSpPr>
-            <a:spLocks noGrp="1"/>
-          </p:cNvSpPr>
-          <p:nvPr>
-            <p:ph idx="1"/>
-          </p:nvPr>
-        </p:nvSpPr>
-        <p:spPr/>
-        <p:txBody>
-          <a:bodyPr/>
-          <a:lstStyle/>
-          <a:p>
-            <a:r>
-              <a:rPr lang="en-US" dirty="0"/>
-              <a:t>Shirak Avakian</a:t>
-            </a:r>
-          </a:p>
-          <a:p>
-            <a:r>
-              <a:rPr lang="en-US" dirty="0"/>
-              <a:t>Enterprise Solution Architect</a:t>
-            </a:r>
-          </a:p>
-          <a:p>
-            <a:r>
-              <a:rPr lang="en-US" dirty="0"/>
-              <a:t>QBI LLC</a:t>
-            </a:r>
-          </a:p>
-          <a:p>
-            <a:r>
-              <a:rPr lang="en-US" dirty="0"/>
-              <a:t>@</a:t>
-            </a:r>
-            <a:r>
-              <a:rPr lang="en-US" dirty="0" err="1"/>
-              <a:t>ShirakAvakian</a:t>
-            </a:r>
-            <a:endParaRPr lang="en-US" dirty="0"/>
-          </a:p>
-          <a:p>
-            <a:r>
-              <a:rPr lang="en-US" dirty="0"/>
-              <a:t>ShirakAvakian@gmail.com</a:t>
-            </a:r>
-          </a:p>
-        </p:txBody>
-      </p:sp>
-      <p:pic>
-        <p:nvPicPr>
-          <p:cNvPr id="4" name="Picture 3"/>
-          <p:cNvPicPr>
-            <a:picLocks noChangeAspect="1"/>
-          </p:cNvPicPr>
-          <p:nvPr/>
-        </p:nvPicPr>
-        <p:blipFill rotWithShape="1">
-          <a:blip r:embed="rId2" cstate="print">
-            <a:extLst>
-              <a:ext uri="{28A0092B-C50C-407E-A947-70E740481C1C}">
-                <a14:useLocalDpi xmlns:a14="http://schemas.microsoft.com/office/drawing/2010/main" val="0"/>
-              </a:ext>
-            </a:extLst>
-          </a:blip>
-          <a:srcRect l="28031" r="12878"/>
-          <a:stretch/>
-        </p:blipFill>
-        <p:spPr>
-          <a:xfrm>
-            <a:off x="6323012" y="1060391"/>
-            <a:ext cx="4343402" cy="4134584"/>
-          </a:xfrm>
-          <a:prstGeom prst="roundRect">
-            <a:avLst>
-              <a:gd name="adj" fmla="val 11111"/>
-            </a:avLst>
-          </a:prstGeom>
-          <a:ln w="190500" cap="rnd">
-            <a:solidFill>
-              <a:srgbClr val="C8C6BD"/>
-            </a:solidFill>
-            <a:prstDash val="solid"/>
-          </a:ln>
-          <a:effectLst>
-            <a:outerShdw blurRad="101600" dist="50800" dir="7200000" algn="tl" rotWithShape="0">
-              <a:srgbClr val="000000">
-                <a:alpha val="45000"/>
-              </a:srgbClr>
-            </a:outerShdw>
-          </a:effectLst>
-          <a:scene3d>
-            <a:camera prst="perspectiveFront" fov="5400000"/>
-            <a:lightRig rig="threePt" dir="t">
-              <a:rot lat="0" lon="0" rev="19200000"/>
-            </a:lightRig>
-          </a:scene3d>
-          <a:sp3d extrusionH="25400">
-            <a:bevelT w="304800" h="152400" prst="hardEdge"/>
-            <a:extrusionClr>
-              <a:srgbClr val="FFFFFF"/>
-            </a:extrusionClr>
-          </a:sp3d>
-        </p:spPr>
-      </p:pic>
-    </p:spTree>
-    <p:extLst>
-      <p:ext uri="{BB962C8B-B14F-4D97-AF65-F5344CB8AC3E}">
-        <p14:creationId xmlns:p14="http://schemas.microsoft.com/office/powerpoint/2010/main" val="711182959"/>
-      </p:ext>
-    </p:extLst>
-  </p:cSld>
-  <p:clrMapOvr>
-    <a:masterClrMapping/>
-  </p:clrMapOvr>
-  <mc:AlternateContent xmlns:mc="http://schemas.openxmlformats.org/markup-compatibility/2006" xmlns:p14="http://schemas.microsoft.com/office/powerpoint/2010/main">
-    <mc:Choice Requires="p14">
-      <p:transition spd="med" p14:dur="700">
-        <p:fade/>
-      </p:transition>
-    </mc:Choice>
-    <mc:Fallback xmlns="">
-      <p:transition spd="med">
-        <p:fade/>
-      </p:transition>
-    </mc:Fallback>
-  </mc:AlternateContent>
-</p:sld>
-</file>
-
-<file path=ppt/slides/slide3.xml><?xml version="1.0" encoding="utf-8"?>
-<p:sld xmlns:a="http://schemas.openxmlformats.org/drawingml/2006/main" xmlns:r="http://schemas.openxmlformats.org/officeDocument/2006/relationships" xmlns:p="http://schemas.openxmlformats.org/presentationml/2006/main">
-  <p:cSld>
-    <p:spTree>
-      <p:nvGrpSpPr>
-        <p:cNvPr id="1" name=""/>
-        <p:cNvGrpSpPr/>
-        <p:nvPr/>
-      </p:nvGrpSpPr>
-      <p:grpSpPr>
-        <a:xfrm>
-          <a:off x="0" y="0"/>
-          <a:ext cx="0" cy="0"/>
-          <a:chOff x="0" y="0"/>
-          <a:chExt cx="0" cy="0"/>
-        </a:xfrm>
-      </p:grpSpPr>
-      <p:sp>
-        <p:nvSpPr>
-          <p:cNvPr id="4" name="Title 12"/>
-          <p:cNvSpPr>
-            <a:spLocks noGrp="1"/>
-          </p:cNvSpPr>
-          <p:nvPr>
-            <p:ph type="title"/>
-          </p:nvPr>
-        </p:nvSpPr>
-        <p:spPr>
-          <a:xfrm>
-            <a:off x="836613" y="533400"/>
-            <a:ext cx="4495800" cy="609600"/>
-          </a:xfrm>
-        </p:spPr>
-        <p:txBody>
-          <a:bodyPr>
-            <a:noAutofit/>
-          </a:bodyPr>
-          <a:lstStyle/>
-          <a:p>
-            <a:r>
-              <a:rPr lang="en-US" sz="3600" dirty="0"/>
-              <a:t>What is PDF</a:t>
-            </a:r>
-          </a:p>
-        </p:txBody>
-      </p:sp>
-      <p:sp>
-        <p:nvSpPr>
-          <p:cNvPr id="5" name="TextBox 4"/>
-          <p:cNvSpPr txBox="1"/>
-          <p:nvPr/>
-        </p:nvSpPr>
-        <p:spPr>
-          <a:xfrm>
-            <a:off x="836612" y="1295400"/>
-            <a:ext cx="6832320" cy="1323439"/>
-          </a:xfrm>
-          <a:prstGeom prst="rect">
-            <a:avLst/>
-          </a:prstGeom>
-          <a:noFill/>
-        </p:spPr>
-        <p:txBody>
-          <a:bodyPr wrap="none" rtlCol="0">
-            <a:spAutoFit/>
-          </a:bodyPr>
-          <a:lstStyle/>
-          <a:p>
-            <a:r>
-              <a:rPr lang="en-US" sz="2000" dirty="0"/>
-              <a:t>Portable Document Format (PDF) is a file format used </a:t>
-            </a:r>
-          </a:p>
-          <a:p>
-            <a:r>
-              <a:rPr lang="en-US" sz="2000" dirty="0"/>
-              <a:t>to present and exchange documents reliably, </a:t>
-            </a:r>
-          </a:p>
-          <a:p>
-            <a:r>
-              <a:rPr lang="en-US" sz="2000" dirty="0"/>
-              <a:t>independent of software, hardware, or operating </a:t>
-            </a:r>
-          </a:p>
-          <a:p>
-            <a:r>
-              <a:rPr lang="en-US" sz="2000" dirty="0"/>
-              <a:t>system. </a:t>
-            </a:r>
-          </a:p>
-        </p:txBody>
-      </p:sp>
-      <p:sp>
-        <p:nvSpPr>
-          <p:cNvPr id="6" name="TextBox 5"/>
-          <p:cNvSpPr txBox="1"/>
-          <p:nvPr/>
-        </p:nvSpPr>
-        <p:spPr>
-          <a:xfrm>
-            <a:off x="912812" y="3811012"/>
-            <a:ext cx="6522940" cy="1938992"/>
-          </a:xfrm>
-          <a:prstGeom prst="rect">
-            <a:avLst/>
-          </a:prstGeom>
-          <a:noFill/>
-        </p:spPr>
-        <p:txBody>
-          <a:bodyPr wrap="none" rtlCol="0">
-            <a:spAutoFit/>
-          </a:bodyPr>
-          <a:lstStyle/>
-          <a:p>
-            <a:pPr marL="342900" indent="-342900">
-              <a:buFont typeface="Arial" panose="020B0604020202020204" pitchFamily="34" charset="0"/>
-              <a:buChar char="•"/>
-            </a:pPr>
-            <a:r>
-              <a:rPr lang="en-US" sz="2000" dirty="0"/>
-              <a:t>Invented by Adobe.</a:t>
-            </a:r>
-          </a:p>
-          <a:p>
-            <a:pPr marL="342900" indent="-342900">
-              <a:buFont typeface="Arial" panose="020B0604020202020204" pitchFamily="34" charset="0"/>
-              <a:buChar char="•"/>
-            </a:pPr>
-            <a:r>
-              <a:rPr lang="en-US" sz="2000" dirty="0"/>
-              <a:t>Open standard maintained by the International </a:t>
-            </a:r>
-          </a:p>
-          <a:p>
-            <a:r>
-              <a:rPr lang="en-US" sz="2000" dirty="0"/>
-              <a:t>     Organization for Standardization (ISO). </a:t>
-            </a:r>
-          </a:p>
-          <a:p>
-            <a:pPr marL="342900" indent="-342900">
-              <a:buFont typeface="Arial" panose="020B0604020202020204" pitchFamily="34" charset="0"/>
-              <a:buChar char="•"/>
-            </a:pPr>
-            <a:r>
-              <a:rPr lang="en-US" sz="2000" dirty="0"/>
-              <a:t>Can contain links and buttons, form fields, </a:t>
-            </a:r>
-          </a:p>
-          <a:p>
-            <a:r>
-              <a:rPr lang="en-US" sz="2000" dirty="0"/>
-              <a:t>     audio, video, and business logic. </a:t>
-            </a:r>
-          </a:p>
-          <a:p>
-            <a:pPr marL="342900" indent="-342900">
-              <a:buFont typeface="Arial" panose="020B0604020202020204" pitchFamily="34" charset="0"/>
-              <a:buChar char="•"/>
-            </a:pPr>
-            <a:r>
-              <a:rPr lang="en-US" sz="2000" dirty="0"/>
-              <a:t>Can also be signed electronically</a:t>
-            </a:r>
-          </a:p>
-        </p:txBody>
-      </p:sp>
-      <p:sp>
-        <p:nvSpPr>
-          <p:cNvPr id="7" name="Title 12"/>
-          <p:cNvSpPr txBox="1">
-            <a:spLocks/>
-          </p:cNvSpPr>
-          <p:nvPr/>
-        </p:nvSpPr>
-        <p:spPr>
-          <a:xfrm>
-            <a:off x="836612" y="3207960"/>
-            <a:ext cx="6400800" cy="838200"/>
-          </a:xfrm>
-          <a:prstGeom prst="rect">
-            <a:avLst/>
-          </a:prstGeom>
-        </p:spPr>
-        <p:txBody>
-          <a:bodyPr vert="horz" lIns="121899" tIns="60949" rIns="121899" bIns="60949" rtlCol="0" anchor="t">
-            <a:normAutofit/>
-          </a:bodyPr>
-          <a:lstStyle>
-            <a:lvl1pPr algn="l" defTabSz="1218987" rtl="0" eaLnBrk="1" latinLnBrk="0" hangingPunct="1">
-              <a:lnSpc>
-                <a:spcPct val="85000"/>
-              </a:lnSpc>
-              <a:spcBef>
-                <a:spcPct val="0"/>
-              </a:spcBef>
-              <a:buNone/>
-              <a:tabLst/>
-              <a:defRPr sz="5400" b="0" kern="1200" cap="none" baseline="0">
-                <a:solidFill>
-                  <a:schemeClr val="tx1"/>
-                </a:solidFill>
-                <a:latin typeface="+mj-lt"/>
-                <a:ea typeface="+mj-ea"/>
-                <a:cs typeface="+mj-cs"/>
-              </a:defRPr>
-            </a:lvl1pPr>
-          </a:lstStyle>
-          <a:p>
-            <a:r>
-              <a:rPr lang="en-US" sz="3600" dirty="0"/>
-              <a:t>Some Facts About PDF</a:t>
-            </a:r>
-          </a:p>
-        </p:txBody>
-      </p:sp>
-    </p:spTree>
-    <p:extLst>
-      <p:ext uri="{BB962C8B-B14F-4D97-AF65-F5344CB8AC3E}">
-        <p14:creationId xmlns:p14="http://schemas.microsoft.com/office/powerpoint/2010/main" val="1997697987"/>
-      </p:ext>
-    </p:extLst>
-  </p:cSld>
-  <p:clrMapOvr>
-    <a:masterClrMapping/>
-  </p:clrMapOvr>
-  <mc:AlternateContent xmlns:mc="http://schemas.openxmlformats.org/markup-compatibility/2006" xmlns:p14="http://schemas.microsoft.com/office/powerpoint/2010/main">
-    <mc:Choice Requires="p14">
-      <p:transition spd="med" p14:dur="700">
-        <p:fade/>
-      </p:transition>
-    </mc:Choice>
-    <mc:Fallback xmlns="">
-      <p:transition spd="med">
-        <p:fade/>
-      </p:transition>
-    </mc:Fallback>
-  </mc:AlternateContent>
-</p:sld>
-</file>
-
-<file path=ppt/slides/slide4.xml><?xml version="1.0" encoding="utf-8"?>
-<p:sld xmlns:a="http://schemas.openxmlformats.org/drawingml/2006/main" xmlns:r="http://schemas.openxmlformats.org/officeDocument/2006/relationships" xmlns:p="http://schemas.openxmlformats.org/presentationml/2006/main">
-  <p:cSld>
-    <p:spTree>
-      <p:nvGrpSpPr>
-        <p:cNvPr id="1" name=""/>
-        <p:cNvGrpSpPr/>
-        <p:nvPr/>
-      </p:nvGrpSpPr>
-      <p:grpSpPr>
-        <a:xfrm>
-          <a:off x="0" y="0"/>
-          <a:ext cx="0" cy="0"/>
-          <a:chOff x="0" y="0"/>
-          <a:chExt cx="0" cy="0"/>
-        </a:xfrm>
-      </p:grpSpPr>
-      <p:sp>
-        <p:nvSpPr>
-          <p:cNvPr id="2" name="Title 1"/>
-          <p:cNvSpPr>
-            <a:spLocks noGrp="1"/>
-          </p:cNvSpPr>
-          <p:nvPr>
-            <p:ph type="title"/>
-          </p:nvPr>
-        </p:nvSpPr>
-        <p:spPr/>
-        <p:txBody>
-          <a:bodyPr/>
-          <a:lstStyle/>
-          <a:p>
-            <a:r>
-              <a:rPr lang="en-US" sz="3600" dirty="0"/>
-              <a:t>History</a:t>
-            </a:r>
-            <a:endParaRPr lang="en-US" dirty="0"/>
-          </a:p>
-        </p:txBody>
-      </p:sp>
-      <p:sp>
-        <p:nvSpPr>
-          <p:cNvPr id="5" name="Content Placeholder 4"/>
-          <p:cNvSpPr>
-            <a:spLocks noGrp="1"/>
-          </p:cNvSpPr>
-          <p:nvPr>
-            <p:ph sz="half" idx="1"/>
-          </p:nvPr>
-        </p:nvSpPr>
-        <p:spPr>
-          <a:xfrm>
-            <a:off x="1117309" y="1701800"/>
-            <a:ext cx="5891504" cy="4470400"/>
-          </a:xfrm>
-        </p:spPr>
-        <p:txBody>
-          <a:bodyPr/>
-          <a:lstStyle/>
-          <a:p>
-            <a:r>
-              <a:rPr lang="en-US" sz="2000" dirty="0"/>
-              <a:t>In 1991, Adobe cofounder Dr. John Warnock launched the paper-to-digital revolution with an idea he called The Camelot Project. </a:t>
-            </a:r>
-          </a:p>
-          <a:p>
-            <a:r>
-              <a:rPr lang="en-US" sz="2000" dirty="0"/>
-              <a:t>By 1992, Camelot had developed into PDF. Today, it is the format trusted by businesses </a:t>
-            </a:r>
-            <a:r>
-              <a:rPr lang="en-US" dirty="0"/>
-              <a:t>around the </a:t>
-            </a:r>
-            <a:r>
-              <a:rPr lang="en-US" sz="2000" dirty="0"/>
-              <a:t>world.</a:t>
-            </a:r>
-          </a:p>
-          <a:p>
-            <a:r>
-              <a:rPr lang="en-US" sz="2000" dirty="0"/>
-              <a:t>Today, Warnock's vision is alive, well, and evolving. Adobe PDFs preserve all the data in the original file - even when text, graphics, spreadsheets, and more</a:t>
-            </a:r>
-            <a:endParaRPr lang="en-US" sz="1800" dirty="0"/>
-          </a:p>
-        </p:txBody>
-      </p:sp>
-      <p:pic>
-        <p:nvPicPr>
-          <p:cNvPr id="4" name="Picture 3"/>
-          <p:cNvPicPr>
-            <a:picLocks noChangeAspect="1"/>
-          </p:cNvPicPr>
-          <p:nvPr/>
-        </p:nvPicPr>
-        <p:blipFill>
-          <a:blip r:embed="rId2">
-            <a:extLst>
-              <a:ext uri="{28A0092B-C50C-407E-A947-70E740481C1C}">
-                <a14:useLocalDpi xmlns:a14="http://schemas.microsoft.com/office/drawing/2010/main" val="0"/>
-              </a:ext>
-            </a:extLst>
-          </a:blip>
-          <a:stretch>
-            <a:fillRect/>
-          </a:stretch>
-        </p:blipFill>
-        <p:spPr>
-          <a:xfrm>
-            <a:off x="7313612" y="1701800"/>
-            <a:ext cx="4257675" cy="2286000"/>
-          </a:xfrm>
-          <a:prstGeom prst="rect">
-            <a:avLst/>
-          </a:prstGeom>
-          <a:ln w="190500" cap="sq">
-            <a:solidFill>
-              <a:srgbClr val="C8C6BD"/>
-            </a:solidFill>
-            <a:prstDash val="solid"/>
-            <a:miter lim="800000"/>
-          </a:ln>
-          <a:effectLst>
-            <a:outerShdw blurRad="254000" algn="bl" rotWithShape="0">
-              <a:srgbClr val="000000">
-                <a:alpha val="43000"/>
-              </a:srgbClr>
-            </a:outerShdw>
-          </a:effectLst>
-          <a:scene3d>
-            <a:camera prst="perspectiveFront" fov="5400000"/>
-            <a:lightRig rig="threePt" dir="t">
-              <a:rot lat="0" lon="0" rev="2100000"/>
-            </a:lightRig>
-          </a:scene3d>
-          <a:sp3d extrusionH="25400">
-            <a:bevelT w="304800" h="152400" prst="hardEdge"/>
-            <a:extrusionClr>
-              <a:srgbClr val="000000"/>
-            </a:extrusionClr>
-          </a:sp3d>
-        </p:spPr>
-      </p:pic>
-    </p:spTree>
-    <p:extLst>
-      <p:ext uri="{BB962C8B-B14F-4D97-AF65-F5344CB8AC3E}">
-        <p14:creationId xmlns:p14="http://schemas.microsoft.com/office/powerpoint/2010/main" val="1157616808"/>
-      </p:ext>
-    </p:extLst>
-  </p:cSld>
-  <p:clrMapOvr>
-    <a:masterClrMapping/>
-  </p:clrMapOvr>
-  <mc:AlternateContent xmlns:mc="http://schemas.openxmlformats.org/markup-compatibility/2006" xmlns:p14="http://schemas.microsoft.com/office/powerpoint/2010/main">
-    <mc:Choice Requires="p14">
-      <p:transition spd="med" p14:dur="700">
-        <p:fade/>
-      </p:transition>
-    </mc:Choice>
-    <mc:Fallback xmlns="">
-      <p:transition spd="med">
-        <p:fade/>
-      </p:transition>
-    </mc:Fallback>
-  </mc:AlternateContent>
-</p:sld>
-</file>
-
-<file path=ppt/slides/slide5.xml><?xml version="1.0" encoding="utf-8"?>
-<p:sld xmlns:a="http://schemas.openxmlformats.org/drawingml/2006/main" xmlns:r="http://schemas.openxmlformats.org/officeDocument/2006/relationships" xmlns:p="http://schemas.openxmlformats.org/presentationml/2006/main">
-  <p:cSld>
-    <p:spTree>
-      <p:nvGrpSpPr>
-        <p:cNvPr id="1" name=""/>
-        <p:cNvGrpSpPr/>
-        <p:nvPr/>
-      </p:nvGrpSpPr>
-      <p:grpSpPr>
-        <a:xfrm>
-          <a:off x="0" y="0"/>
-          <a:ext cx="0" cy="0"/>
-          <a:chOff x="0" y="0"/>
-          <a:chExt cx="0" cy="0"/>
-        </a:xfrm>
-      </p:grpSpPr>
-      <p:sp>
-        <p:nvSpPr>
-          <p:cNvPr id="2" name="Title 1"/>
-          <p:cNvSpPr>
-            <a:spLocks noGrp="1"/>
-          </p:cNvSpPr>
-          <p:nvPr>
-            <p:ph type="title"/>
-          </p:nvPr>
-        </p:nvSpPr>
-        <p:spPr/>
-        <p:txBody>
-          <a:bodyPr/>
-          <a:lstStyle/>
-          <a:p>
-            <a:r>
-              <a:rPr lang="en-US" sz="3600" dirty="0"/>
-              <a:t>Security</a:t>
-            </a:r>
-            <a:endParaRPr lang="en-US" dirty="0"/>
-          </a:p>
-        </p:txBody>
-      </p:sp>
-      <p:sp>
-        <p:nvSpPr>
-          <p:cNvPr id="5" name="Content Placeholder 4"/>
-          <p:cNvSpPr>
-            <a:spLocks noGrp="1"/>
-          </p:cNvSpPr>
-          <p:nvPr>
-            <p:ph sz="half" idx="1"/>
-          </p:nvPr>
-        </p:nvSpPr>
-        <p:spPr>
-          <a:xfrm>
-            <a:off x="1117309" y="1701800"/>
-            <a:ext cx="5891504" cy="2870200"/>
-          </a:xfrm>
-        </p:spPr>
-        <p:txBody>
-          <a:bodyPr/>
-          <a:lstStyle/>
-          <a:p>
-            <a:r>
-              <a:rPr lang="en-US" sz="2000" dirty="0"/>
-              <a:t>Password protect your PDF </a:t>
-            </a:r>
-          </a:p>
-          <a:p>
-            <a:r>
-              <a:rPr lang="en-US" sz="2000" dirty="0"/>
-              <a:t>Redact </a:t>
-            </a:r>
-            <a:r>
-              <a:rPr lang="en-US" dirty="0"/>
-              <a:t>sensitive information</a:t>
-            </a:r>
-            <a:endParaRPr lang="en-US" sz="2000" dirty="0"/>
-          </a:p>
-          <a:p>
-            <a:r>
-              <a:rPr lang="en-US" sz="2000" dirty="0"/>
-              <a:t>Sanitization—Remove hidden data from PDF</a:t>
-            </a:r>
-          </a:p>
-          <a:p>
-            <a:r>
-              <a:rPr lang="en-US" sz="2000" dirty="0"/>
-              <a:t>Digitally sign the PDF using private/public key pair </a:t>
-            </a:r>
-            <a:endParaRPr lang="en-US" sz="1800" dirty="0"/>
-          </a:p>
-        </p:txBody>
-      </p:sp>
-      <p:pic>
-        <p:nvPicPr>
-          <p:cNvPr id="3" name="Picture 2"/>
-          <p:cNvPicPr>
-            <a:picLocks noChangeAspect="1"/>
-          </p:cNvPicPr>
-          <p:nvPr/>
-        </p:nvPicPr>
-        <p:blipFill>
-          <a:blip r:embed="rId2">
-            <a:extLst>
-              <a:ext uri="{28A0092B-C50C-407E-A947-70E740481C1C}">
-                <a14:useLocalDpi xmlns:a14="http://schemas.microsoft.com/office/drawing/2010/main" val="0"/>
-              </a:ext>
-            </a:extLst>
-          </a:blip>
-          <a:stretch>
-            <a:fillRect/>
-          </a:stretch>
-        </p:blipFill>
-        <p:spPr>
-          <a:xfrm>
-            <a:off x="8075612" y="1828800"/>
-            <a:ext cx="2284922" cy="2284922"/>
-          </a:xfrm>
-          <a:prstGeom prst="rect">
-            <a:avLst/>
-          </a:prstGeom>
-        </p:spPr>
-      </p:pic>
-    </p:spTree>
-    <p:extLst>
-      <p:ext uri="{BB962C8B-B14F-4D97-AF65-F5344CB8AC3E}">
-        <p14:creationId xmlns:p14="http://schemas.microsoft.com/office/powerpoint/2010/main" val="3573450425"/>
-      </p:ext>
-    </p:extLst>
-  </p:cSld>
-  <p:clrMapOvr>
-    <a:masterClrMapping/>
-  </p:clrMapOvr>
-  <mc:AlternateContent xmlns:mc="http://schemas.openxmlformats.org/markup-compatibility/2006" xmlns:p14="http://schemas.microsoft.com/office/powerpoint/2010/main">
-    <mc:Choice Requires="p14">
-      <p:transition spd="med" p14:dur="700">
-        <p:fade/>
-      </p:transition>
-    </mc:Choice>
-    <mc:Fallback xmlns="">
-      <p:transition spd="med">
-        <p:fade/>
-      </p:transition>
-    </mc:Fallback>
-  </mc:AlternateContent>
-</p:sld>
-</file>
-
-<file path=ppt/slides/slide6.xml><?xml version="1.0" encoding="utf-8"?>
-<p:sld xmlns:a="http://schemas.openxmlformats.org/drawingml/2006/main" xmlns:r="http://schemas.openxmlformats.org/officeDocument/2006/relationships" xmlns:p="http://schemas.openxmlformats.org/presentationml/2006/main">
-  <p:cSld>
-    <p:spTree>
-      <p:nvGrpSpPr>
-        <p:cNvPr id="1" name=""/>
-        <p:cNvGrpSpPr/>
-        <p:nvPr/>
-      </p:nvGrpSpPr>
-      <p:grpSpPr>
-        <a:xfrm>
-          <a:off x="0" y="0"/>
-          <a:ext cx="0" cy="0"/>
-          <a:chOff x="0" y="0"/>
-          <a:chExt cx="0" cy="0"/>
-        </a:xfrm>
-      </p:grpSpPr>
-      <p:sp>
-        <p:nvSpPr>
-          <p:cNvPr id="2" name="Title 1"/>
-          <p:cNvSpPr>
-            <a:spLocks noGrp="1"/>
-          </p:cNvSpPr>
-          <p:nvPr>
-            <p:ph type="title"/>
-          </p:nvPr>
-        </p:nvSpPr>
-        <p:spPr/>
-        <p:txBody>
-          <a:bodyPr/>
-          <a:lstStyle/>
-          <a:p>
-            <a:r>
-              <a:rPr lang="en-US" sz="3600" dirty="0"/>
-              <a:t>Conclusion</a:t>
-            </a:r>
-            <a:endParaRPr lang="en-US" dirty="0"/>
-          </a:p>
-        </p:txBody>
-      </p:sp>
-      <p:sp>
-        <p:nvSpPr>
-          <p:cNvPr id="5" name="Content Placeholder 4"/>
-          <p:cNvSpPr>
-            <a:spLocks noGrp="1"/>
-          </p:cNvSpPr>
-          <p:nvPr>
-            <p:ph sz="half" idx="1"/>
-          </p:nvPr>
-        </p:nvSpPr>
-        <p:spPr>
-          <a:xfrm>
-            <a:off x="1117309" y="1701800"/>
-            <a:ext cx="5891504" cy="3708400"/>
-          </a:xfrm>
-        </p:spPr>
-        <p:txBody>
-          <a:bodyPr>
-            <a:normAutofit/>
-          </a:bodyPr>
-          <a:lstStyle/>
-          <a:p>
-            <a:r>
-              <a:rPr lang="en-US" sz="2000" dirty="0"/>
-              <a:t>If you can share &amp; reduce physical occupation of 1000 books to 1000 PDF digital files resting in your lap. </a:t>
-            </a:r>
-          </a:p>
-          <a:p>
-            <a:r>
-              <a:rPr lang="en-US" sz="2000" dirty="0"/>
-              <a:t>If you can search for files, pages within seconds</a:t>
-            </a:r>
-          </a:p>
-          <a:p>
-            <a:r>
-              <a:rPr lang="en-US" sz="2000" dirty="0"/>
-              <a:t>If you can sign, edit, comment, stamp PDF</a:t>
-            </a:r>
-          </a:p>
-          <a:p>
-            <a:r>
-              <a:rPr lang="en-US" sz="2000" dirty="0"/>
-              <a:t>If you can secure a PDF</a:t>
-            </a:r>
-          </a:p>
-          <a:p>
-            <a:r>
-              <a:rPr lang="en-US" sz="2000" dirty="0"/>
-              <a:t>If all above can be done by a PDF, shouldn’t we call it SMART?</a:t>
-            </a:r>
-          </a:p>
-        </p:txBody>
-      </p:sp>
-      <p:pic>
-        <p:nvPicPr>
-          <p:cNvPr id="4" name="Picture 3"/>
-          <p:cNvPicPr>
-            <a:picLocks noChangeAspect="1"/>
-          </p:cNvPicPr>
-          <p:nvPr/>
-        </p:nvPicPr>
-        <p:blipFill>
-          <a:blip r:embed="rId2" cstate="print">
-            <a:extLst>
-              <a:ext uri="{28A0092B-C50C-407E-A947-70E740481C1C}">
-                <a14:useLocalDpi xmlns:a14="http://schemas.microsoft.com/office/drawing/2010/main" val="0"/>
-              </a:ext>
-            </a:extLst>
-          </a:blip>
-          <a:stretch>
-            <a:fillRect/>
-          </a:stretch>
-        </p:blipFill>
-        <p:spPr>
-          <a:xfrm>
-            <a:off x="7011799" y="1701800"/>
-            <a:ext cx="4721651" cy="3022600"/>
-          </a:xfrm>
-          <a:prstGeom prst="rect">
-            <a:avLst/>
-          </a:prstGeom>
-          <a:ln w="190500" cap="sq">
-            <a:solidFill>
-              <a:srgbClr val="C8C6BD"/>
-            </a:solidFill>
-            <a:prstDash val="solid"/>
-            <a:miter lim="800000"/>
-          </a:ln>
-          <a:effectLst>
-            <a:outerShdw blurRad="254000" algn="bl" rotWithShape="0">
-              <a:srgbClr val="000000">
-                <a:alpha val="43000"/>
-              </a:srgbClr>
-            </a:outerShdw>
-          </a:effectLst>
-          <a:scene3d>
-            <a:camera prst="perspectiveFront" fov="5400000"/>
-            <a:lightRig rig="threePt" dir="t">
-              <a:rot lat="0" lon="0" rev="2100000"/>
-            </a:lightRig>
-          </a:scene3d>
-          <a:sp3d extrusionH="25400">
-            <a:bevelT w="304800" h="152400" prst="hardEdge"/>
-            <a:extrusionClr>
-              <a:srgbClr val="000000"/>
-            </a:extrusionClr>
-          </a:sp3d>
-        </p:spPr>
-      </p:pic>
-      <p:pic>
-        <p:nvPicPr>
-          <p:cNvPr id="6" name="Picture 5"/>
-          <p:cNvPicPr>
-            <a:picLocks noChangeAspect="1"/>
-          </p:cNvPicPr>
-          <p:nvPr/>
-        </p:nvPicPr>
-        <p:blipFill>
-          <a:blip r:embed="rId3" cstate="print">
-            <a:extLst>
-              <a:ext uri="{28A0092B-C50C-407E-A947-70E740481C1C}">
-                <a14:useLocalDpi xmlns:a14="http://schemas.microsoft.com/office/drawing/2010/main" val="0"/>
-              </a:ext>
-            </a:extLst>
-          </a:blip>
-          <a:stretch>
-            <a:fillRect/>
-          </a:stretch>
-        </p:blipFill>
-        <p:spPr>
-          <a:xfrm>
-            <a:off x="10666413" y="1905000"/>
-            <a:ext cx="874276" cy="874276"/>
-          </a:xfrm>
-          <a:prstGeom prst="rect">
-            <a:avLst/>
-          </a:prstGeom>
-        </p:spPr>
-      </p:pic>
-    </p:spTree>
-    <p:extLst>
-      <p:ext uri="{BB962C8B-B14F-4D97-AF65-F5344CB8AC3E}">
-        <p14:creationId xmlns:p14="http://schemas.microsoft.com/office/powerpoint/2010/main" val="1249482091"/>
-      </p:ext>
-    </p:extLst>
-  </p:cSld>
-  <p:clrMapOvr>
-    <a:masterClrMapping/>
-  </p:clrMapOvr>
-  <mc:AlternateContent xmlns:mc="http://schemas.openxmlformats.org/markup-compatibility/2006" xmlns:p14="http://schemas.microsoft.com/office/powerpoint/2010/main">
-    <mc:Choice Requires="p14">
-      <p:transition spd="med" p14:dur="700">
-        <p:fade/>
-      </p:transition>
-    </mc:Choice>
-    <mc:Fallback xmlns="">
-      <p:transition spd="med">
-        <p:fade/>
-      </p:transition>
-    </mc:Fallback>
-  </mc:AlternateContent>
-</p:sld>
-</file>
-
-<file path=ppt/slides/slide7.xml><?xml version="1.0" encoding="utf-8"?>
-<p:sld xmlns:a="http://schemas.openxmlformats.org/drawingml/2006/main" xmlns:r="http://schemas.openxmlformats.org/officeDocument/2006/relationships" xmlns:p="http://schemas.openxmlformats.org/presentationml/2006/main">
-  <p:cSld>
-    <p:spTree>
-      <p:nvGrpSpPr>
-        <p:cNvPr id="1" name=""/>
-        <p:cNvGrpSpPr/>
-        <p:nvPr/>
-      </p:nvGrpSpPr>
-      <p:grpSpPr>
-        <a:xfrm>
-          <a:off x="0" y="0"/>
-          <a:ext cx="0" cy="0"/>
-          <a:chOff x="0" y="0"/>
-          <a:chExt cx="0" cy="0"/>
-        </a:xfrm>
-      </p:grpSpPr>
-      <p:sp>
-        <p:nvSpPr>
-          <p:cNvPr id="2" name="Title 1"/>
-          <p:cNvSpPr>
-            <a:spLocks noGrp="1"/>
-          </p:cNvSpPr>
-          <p:nvPr>
-            <p:ph type="title"/>
-          </p:nvPr>
-        </p:nvSpPr>
-        <p:spPr>
-          <a:xfrm>
-            <a:off x="989012" y="76199"/>
-            <a:ext cx="10157354" cy="1397000"/>
-          </a:xfrm>
-        </p:spPr>
-        <p:txBody>
-          <a:bodyPr/>
-          <a:lstStyle/>
-          <a:p>
-            <a:pPr algn="ctr"/>
-            <a:r>
-              <a:rPr lang="en-US" sz="3600" dirty="0"/>
-              <a:t>Not yet, until we make it smarter by</a:t>
-            </a:r>
-            <a:endParaRPr lang="en-US" dirty="0"/>
-          </a:p>
-        </p:txBody>
-      </p:sp>
-      <p:sp>
-        <p:nvSpPr>
-          <p:cNvPr id="7" name="Content Placeholder 4"/>
-          <p:cNvSpPr>
-            <a:spLocks noGrp="1"/>
-          </p:cNvSpPr>
-          <p:nvPr>
-            <p:ph sz="half" idx="1"/>
-          </p:nvPr>
-        </p:nvSpPr>
-        <p:spPr>
-          <a:xfrm>
-            <a:off x="1827212" y="3581400"/>
-            <a:ext cx="6248400" cy="1143000"/>
-          </a:xfrm>
-        </p:spPr>
-        <p:txBody>
-          <a:bodyPr>
-            <a:normAutofit/>
-          </a:bodyPr>
-          <a:lstStyle/>
-          <a:p>
-            <a:r>
-              <a:rPr lang="en-US" sz="2000" dirty="0"/>
-              <a:t>Custom Properties</a:t>
-            </a:r>
-          </a:p>
-          <a:p>
-            <a:r>
-              <a:rPr lang="en-US" sz="2000" dirty="0"/>
-              <a:t>Barcode</a:t>
-            </a:r>
-          </a:p>
-        </p:txBody>
-      </p:sp>
-      <p:sp>
-        <p:nvSpPr>
-          <p:cNvPr id="8" name="Rectangle 7"/>
-          <p:cNvSpPr/>
-          <p:nvPr/>
-        </p:nvSpPr>
-        <p:spPr>
-          <a:xfrm>
-            <a:off x="3324489" y="1823134"/>
-            <a:ext cx="5486400" cy="646331"/>
-          </a:xfrm>
-          <a:prstGeom prst="rect">
-            <a:avLst/>
-          </a:prstGeom>
-        </p:spPr>
-        <p:txBody>
-          <a:bodyPr wrap="square">
-            <a:spAutoFit/>
-          </a:bodyPr>
-          <a:lstStyle/>
-          <a:p>
-            <a:pPr algn="ctr"/>
-            <a:r>
-              <a:rPr lang="en-US" sz="3600" dirty="0"/>
-              <a:t>Predefining workflow</a:t>
-            </a:r>
-          </a:p>
-        </p:txBody>
-      </p:sp>
-    </p:spTree>
-    <p:extLst>
-      <p:ext uri="{BB962C8B-B14F-4D97-AF65-F5344CB8AC3E}">
-        <p14:creationId xmlns:p14="http://schemas.microsoft.com/office/powerpoint/2010/main" val="3061753476"/>
-      </p:ext>
-    </p:extLst>
-  </p:cSld>
-  <p:clrMapOvr>
-    <a:masterClrMapping/>
-  </p:clrMapOvr>
-  <mc:AlternateContent xmlns:mc="http://schemas.openxmlformats.org/markup-compatibility/2006" xmlns:p14="http://schemas.microsoft.com/office/powerpoint/2010/main">
-    <mc:Choice Requires="p14">
-      <p:transition spd="med" p14:dur="700">
-        <p:fade/>
-      </p:transition>
-    </mc:Choice>
-    <mc:Fallback xmlns="">
-      <p:transition spd="med">
-        <p:fade/>
-      </p:transition>
-    </mc:Fallback>
-  </mc:AlternateContent>
-</p:sld>
-</file>
-
-<file path=ppt/slides/slide8.xml><?xml version="1.0" encoding="utf-8"?>
-<p:sld xmlns:a="http://schemas.openxmlformats.org/drawingml/2006/main" xmlns:r="http://schemas.openxmlformats.org/officeDocument/2006/relationships" xmlns:p="http://schemas.openxmlformats.org/presentationml/2006/main">
-  <p:cSld>
-    <p:spTree>
-      <p:nvGrpSpPr>
-        <p:cNvPr id="1" name=""/>
-        <p:cNvGrpSpPr/>
-        <p:nvPr/>
-      </p:nvGrpSpPr>
-      <p:grpSpPr>
-        <a:xfrm>
-          <a:off x="0" y="0"/>
-          <a:ext cx="0" cy="0"/>
-          <a:chOff x="0" y="0"/>
-          <a:chExt cx="0" cy="0"/>
-        </a:xfrm>
-      </p:grpSpPr>
-      <p:sp>
-        <p:nvSpPr>
-          <p:cNvPr id="2" name="Title 1"/>
-          <p:cNvSpPr>
-            <a:spLocks noGrp="1"/>
-          </p:cNvSpPr>
-          <p:nvPr>
-            <p:ph type="title"/>
-          </p:nvPr>
-        </p:nvSpPr>
-        <p:spPr/>
-        <p:txBody>
-          <a:bodyPr/>
-          <a:lstStyle/>
-          <a:p>
-            <a:r>
-              <a:rPr lang="en-US" dirty="0"/>
-              <a:t>Title and Content Layout with Chart </a:t>
-            </a:r>
-          </a:p>
-        </p:txBody>
-      </p:sp>
-      <p:graphicFrame>
-        <p:nvGraphicFramePr>
-          <p:cNvPr id="7" name="Content Placeholder 6" descr="Line" title="Chart"/>
-          <p:cNvGraphicFramePr>
-            <a:graphicFrameLocks noGrp="1"/>
-          </p:cNvGraphicFramePr>
-          <p:nvPr>
-            <p:ph idx="1"/>
-            <p:extLst>
-              <p:ext uri="{D42A27DB-BD31-4B8C-83A1-F6EECF244321}">
-                <p14:modId xmlns:p14="http://schemas.microsoft.com/office/powerpoint/2010/main" val="2432020898"/>
-              </p:ext>
-            </p:extLst>
-          </p:nvPr>
-        </p:nvGraphicFramePr>
-        <p:xfrm>
-          <a:off x="1117600" y="1701800"/>
-          <a:ext cx="10156825" cy="4470400"/>
-        </p:xfrm>
-        <a:graphic>
-          <a:graphicData uri="http://schemas.openxmlformats.org/drawingml/2006/chart">
-            <c:chart xmlns:c="http://schemas.openxmlformats.org/drawingml/2006/chart" xmlns:r="http://schemas.openxmlformats.org/officeDocument/2006/relationships" r:id="rId2"/>
-          </a:graphicData>
-        </a:graphic>
-      </p:graphicFrame>
-    </p:spTree>
-    <p:extLst>
-      <p:ext uri="{BB962C8B-B14F-4D97-AF65-F5344CB8AC3E}">
-        <p14:creationId xmlns:p14="http://schemas.microsoft.com/office/powerpoint/2010/main" val="2474917317"/>
-      </p:ext>
-    </p:extLst>
-  </p:cSld>
-  <p:clrMapOvr>
-    <a:masterClrMapping/>
-  </p:clrMapOvr>
-  <mc:AlternateContent xmlns:mc="http://schemas.openxmlformats.org/markup-compatibility/2006" xmlns:p14="http://schemas.microsoft.com/office/powerpoint/2010/main">
-    <mc:Choice Requires="p14">
-      <p:transition spd="med" p14:dur="700">
-        <p:fade/>
-      </p:transition>
-    </mc:Choice>
-    <mc:Fallback xmlns="">
-      <p:transition spd="med">
-        <p:fade/>
-      </p:transition>
-    </mc:Fallback>
-  </mc:AlternateContent>
-</p:sld>
-</file>
-
-<file path=ppt/slides/slide9.xml><?xml version="1.0" encoding="utf-8"?>
 <p:sld xmlns:a="http://schemas.openxmlformats.org/drawingml/2006/main" xmlns:r="http://schemas.openxmlformats.org/officeDocument/2006/relationships" xmlns:p="http://schemas.openxmlformats.org/presentationml/2006/main">
   <p:cSld>
     <p:spTree>
@@ -9994,6 +8283,1893 @@
     <p:extLst>
       <p:ext uri="{BB962C8B-B14F-4D97-AF65-F5344CB8AC3E}">
         <p14:creationId xmlns:p14="http://schemas.microsoft.com/office/powerpoint/2010/main" val="6860444"/>
+      </p:ext>
+    </p:extLst>
+  </p:cSld>
+  <p:clrMapOvr>
+    <a:masterClrMapping/>
+  </p:clrMapOvr>
+  <mc:AlternateContent xmlns:mc="http://schemas.openxmlformats.org/markup-compatibility/2006" xmlns:p14="http://schemas.microsoft.com/office/powerpoint/2010/main">
+    <mc:Choice Requires="p14">
+      <p:transition spd="med" p14:dur="700">
+        <p:fade/>
+      </p:transition>
+    </mc:Choice>
+    <mc:Fallback xmlns="">
+      <p:transition spd="med">
+        <p:fade/>
+      </p:transition>
+    </mc:Fallback>
+  </mc:AlternateContent>
+</p:sld>
+</file>
+
+<file path=ppt/slides/slide11.xml><?xml version="1.0" encoding="utf-8"?>
+<p:sld xmlns:a="http://schemas.openxmlformats.org/drawingml/2006/main" xmlns:r="http://schemas.openxmlformats.org/officeDocument/2006/relationships" xmlns:p="http://schemas.openxmlformats.org/presentationml/2006/main">
+  <p:cSld>
+    <p:spTree>
+      <p:nvGrpSpPr>
+        <p:cNvPr id="1" name=""/>
+        <p:cNvGrpSpPr/>
+        <p:nvPr/>
+      </p:nvGrpSpPr>
+      <p:grpSpPr>
+        <a:xfrm>
+          <a:off x="0" y="0"/>
+          <a:ext cx="0" cy="0"/>
+          <a:chOff x="0" y="0"/>
+          <a:chExt cx="0" cy="0"/>
+        </a:xfrm>
+      </p:grpSpPr>
+      <p:sp>
+        <p:nvSpPr>
+          <p:cNvPr id="2" name="Title 1"/>
+          <p:cNvSpPr>
+            <a:spLocks noGrp="1"/>
+          </p:cNvSpPr>
+          <p:nvPr>
+            <p:ph type="title"/>
+          </p:nvPr>
+        </p:nvSpPr>
+        <p:spPr/>
+        <p:txBody>
+          <a:bodyPr/>
+          <a:lstStyle/>
+          <a:p>
+            <a:r>
+              <a:rPr lang="en-US"/>
+              <a:t>Two Content Layout with SmartArt</a:t>
+            </a:r>
+            <a:endParaRPr lang="en-US" dirty="0"/>
+          </a:p>
+        </p:txBody>
+      </p:sp>
+      <p:graphicFrame>
+        <p:nvGraphicFramePr>
+          <p:cNvPr id="4" name="Content Placeholder 3" descr="Vertical Bullet List" title="SmartArt"/>
+          <p:cNvGraphicFramePr>
+            <a:graphicFrameLocks noGrp="1"/>
+          </p:cNvGraphicFramePr>
+          <p:nvPr>
+            <p:ph sz="half" idx="1"/>
+            <p:extLst>
+              <p:ext uri="{D42A27DB-BD31-4B8C-83A1-F6EECF244321}">
+                <p14:modId xmlns:p14="http://schemas.microsoft.com/office/powerpoint/2010/main" val="793007413"/>
+              </p:ext>
+            </p:extLst>
+          </p:nvPr>
+        </p:nvGraphicFramePr>
+        <p:xfrm>
+          <a:off x="1117600" y="1701800"/>
+          <a:ext cx="4976813" cy="4470400"/>
+        </p:xfrm>
+        <a:graphic>
+          <a:graphicData uri="http://schemas.openxmlformats.org/drawingml/2006/diagram">
+            <dgm:relIds xmlns:dgm="http://schemas.openxmlformats.org/drawingml/2006/diagram" xmlns:r="http://schemas.openxmlformats.org/officeDocument/2006/relationships" r:dm="rId2" r:lo="rId3" r:qs="rId4" r:cs="rId5"/>
+          </a:graphicData>
+        </a:graphic>
+      </p:graphicFrame>
+      <p:sp>
+        <p:nvSpPr>
+          <p:cNvPr id="6" name="Content Placeholder 5"/>
+          <p:cNvSpPr>
+            <a:spLocks noGrp="1"/>
+          </p:cNvSpPr>
+          <p:nvPr>
+            <p:ph sz="half" idx="2"/>
+          </p:nvPr>
+        </p:nvSpPr>
+        <p:spPr/>
+        <p:txBody>
+          <a:bodyPr/>
+          <a:lstStyle/>
+          <a:p>
+            <a:r>
+              <a:rPr lang="en-US"/>
+              <a:t>First bullet point here</a:t>
+            </a:r>
+          </a:p>
+          <a:p>
+            <a:r>
+              <a:rPr lang="en-US"/>
+              <a:t>Second bullet point here</a:t>
+            </a:r>
+          </a:p>
+          <a:p>
+            <a:r>
+              <a:rPr lang="en-US"/>
+              <a:t>Third bullet point here</a:t>
+            </a:r>
+            <a:endParaRPr lang="en-US" dirty="0"/>
+          </a:p>
+        </p:txBody>
+      </p:sp>
+    </p:spTree>
+    <p:extLst>
+      <p:ext uri="{BB962C8B-B14F-4D97-AF65-F5344CB8AC3E}">
+        <p14:creationId xmlns:p14="http://schemas.microsoft.com/office/powerpoint/2010/main" val="13403576"/>
+      </p:ext>
+    </p:extLst>
+  </p:cSld>
+  <p:clrMapOvr>
+    <a:masterClrMapping/>
+  </p:clrMapOvr>
+  <mc:AlternateContent xmlns:mc="http://schemas.openxmlformats.org/markup-compatibility/2006" xmlns:p14="http://schemas.microsoft.com/office/powerpoint/2010/main">
+    <mc:Choice Requires="p14">
+      <p:transition spd="med" p14:dur="700">
+        <p:fade/>
+      </p:transition>
+    </mc:Choice>
+    <mc:Fallback xmlns="">
+      <p:transition spd="med">
+        <p:fade/>
+      </p:transition>
+    </mc:Fallback>
+  </mc:AlternateContent>
+</p:sld>
+</file>
+
+<file path=ppt/slides/slide12.xml><?xml version="1.0" encoding="utf-8"?>
+<p:sld xmlns:a="http://schemas.openxmlformats.org/drawingml/2006/main" xmlns:r="http://schemas.openxmlformats.org/officeDocument/2006/relationships" xmlns:p="http://schemas.openxmlformats.org/presentationml/2006/main">
+  <p:cSld>
+    <p:spTree>
+      <p:nvGrpSpPr>
+        <p:cNvPr id="1" name=""/>
+        <p:cNvGrpSpPr/>
+        <p:nvPr/>
+      </p:nvGrpSpPr>
+      <p:grpSpPr>
+        <a:xfrm>
+          <a:off x="0" y="0"/>
+          <a:ext cx="0" cy="0"/>
+          <a:chOff x="0" y="0"/>
+          <a:chExt cx="0" cy="0"/>
+        </a:xfrm>
+      </p:grpSpPr>
+      <p:sp>
+        <p:nvSpPr>
+          <p:cNvPr id="2" name="Title 1"/>
+          <p:cNvSpPr>
+            <a:spLocks noGrp="1"/>
+          </p:cNvSpPr>
+          <p:nvPr>
+            <p:ph type="title"/>
+          </p:nvPr>
+        </p:nvSpPr>
+        <p:spPr/>
+        <p:txBody>
+          <a:bodyPr/>
+          <a:lstStyle/>
+          <a:p>
+            <a:endParaRPr lang="en-US" dirty="0"/>
+          </a:p>
+        </p:txBody>
+      </p:sp>
+      <p:sp>
+        <p:nvSpPr>
+          <p:cNvPr id="5" name="Text Placeholder 4"/>
+          <p:cNvSpPr>
+            <a:spLocks noGrp="1"/>
+          </p:cNvSpPr>
+          <p:nvPr>
+            <p:ph type="body" idx="1"/>
+          </p:nvPr>
+        </p:nvSpPr>
+        <p:spPr/>
+        <p:txBody>
+          <a:bodyPr/>
+          <a:lstStyle/>
+          <a:p>
+            <a:endParaRPr lang="en-US" dirty="0"/>
+          </a:p>
+        </p:txBody>
+      </p:sp>
+      <p:sp>
+        <p:nvSpPr>
+          <p:cNvPr id="3" name="Content Placeholder 2"/>
+          <p:cNvSpPr>
+            <a:spLocks noGrp="1"/>
+          </p:cNvSpPr>
+          <p:nvPr>
+            <p:ph sz="half" idx="2"/>
+          </p:nvPr>
+        </p:nvSpPr>
+        <p:spPr/>
+        <p:txBody>
+          <a:bodyPr/>
+          <a:lstStyle/>
+          <a:p>
+            <a:endParaRPr lang="en-US" dirty="0"/>
+          </a:p>
+        </p:txBody>
+      </p:sp>
+      <p:sp>
+        <p:nvSpPr>
+          <p:cNvPr id="6" name="Text Placeholder 5"/>
+          <p:cNvSpPr>
+            <a:spLocks noGrp="1"/>
+          </p:cNvSpPr>
+          <p:nvPr>
+            <p:ph type="body" sz="quarter" idx="3"/>
+          </p:nvPr>
+        </p:nvSpPr>
+        <p:spPr/>
+        <p:txBody>
+          <a:bodyPr/>
+          <a:lstStyle/>
+          <a:p>
+            <a:endParaRPr lang="en-US" dirty="0"/>
+          </a:p>
+        </p:txBody>
+      </p:sp>
+      <p:sp>
+        <p:nvSpPr>
+          <p:cNvPr id="4" name="Content Placeholder 3"/>
+          <p:cNvSpPr>
+            <a:spLocks noGrp="1"/>
+          </p:cNvSpPr>
+          <p:nvPr>
+            <p:ph sz="quarter" idx="4"/>
+          </p:nvPr>
+        </p:nvSpPr>
+        <p:spPr/>
+        <p:txBody>
+          <a:bodyPr/>
+          <a:lstStyle/>
+          <a:p>
+            <a:endParaRPr lang="en-US" dirty="0"/>
+          </a:p>
+        </p:txBody>
+      </p:sp>
+    </p:spTree>
+    <p:extLst>
+      <p:ext uri="{BB962C8B-B14F-4D97-AF65-F5344CB8AC3E}">
+        <p14:creationId xmlns:p14="http://schemas.microsoft.com/office/powerpoint/2010/main" val="3296948863"/>
+      </p:ext>
+    </p:extLst>
+  </p:cSld>
+  <p:clrMapOvr>
+    <a:masterClrMapping/>
+  </p:clrMapOvr>
+  <mc:AlternateContent xmlns:mc="http://schemas.openxmlformats.org/markup-compatibility/2006" xmlns:p14="http://schemas.microsoft.com/office/powerpoint/2010/main">
+    <mc:Choice Requires="p14">
+      <p:transition spd="med" p14:dur="700">
+        <p:fade/>
+      </p:transition>
+    </mc:Choice>
+    <mc:Fallback xmlns="">
+      <p:transition spd="med">
+        <p:fade/>
+      </p:transition>
+    </mc:Fallback>
+  </mc:AlternateContent>
+</p:sld>
+</file>
+
+<file path=ppt/slides/slide13.xml><?xml version="1.0" encoding="utf-8"?>
+<p:sld xmlns:a="http://schemas.openxmlformats.org/drawingml/2006/main" xmlns:r="http://schemas.openxmlformats.org/officeDocument/2006/relationships" xmlns:p="http://schemas.openxmlformats.org/presentationml/2006/main">
+  <p:cSld>
+    <p:spTree>
+      <p:nvGrpSpPr>
+        <p:cNvPr id="1" name=""/>
+        <p:cNvGrpSpPr/>
+        <p:nvPr/>
+      </p:nvGrpSpPr>
+      <p:grpSpPr>
+        <a:xfrm>
+          <a:off x="0" y="0"/>
+          <a:ext cx="0" cy="0"/>
+          <a:chOff x="0" y="0"/>
+          <a:chExt cx="0" cy="0"/>
+        </a:xfrm>
+      </p:grpSpPr>
+      <p:sp>
+        <p:nvSpPr>
+          <p:cNvPr id="2" name="Title 1"/>
+          <p:cNvSpPr>
+            <a:spLocks noGrp="1"/>
+          </p:cNvSpPr>
+          <p:nvPr>
+            <p:ph type="title"/>
+          </p:nvPr>
+        </p:nvSpPr>
+        <p:spPr/>
+        <p:txBody>
+          <a:bodyPr/>
+          <a:lstStyle/>
+          <a:p>
+            <a:endParaRPr lang="en-US" dirty="0"/>
+          </a:p>
+        </p:txBody>
+      </p:sp>
+    </p:spTree>
+    <p:extLst>
+      <p:ext uri="{BB962C8B-B14F-4D97-AF65-F5344CB8AC3E}">
+        <p14:creationId xmlns:p14="http://schemas.microsoft.com/office/powerpoint/2010/main" val="1653943558"/>
+      </p:ext>
+    </p:extLst>
+  </p:cSld>
+  <p:clrMapOvr>
+    <a:masterClrMapping/>
+  </p:clrMapOvr>
+  <mc:AlternateContent xmlns:mc="http://schemas.openxmlformats.org/markup-compatibility/2006" xmlns:p14="http://schemas.microsoft.com/office/powerpoint/2010/main">
+    <mc:Choice Requires="p14">
+      <p:transition spd="med" p14:dur="700">
+        <p:fade/>
+      </p:transition>
+    </mc:Choice>
+    <mc:Fallback xmlns="">
+      <p:transition spd="med">
+        <p:fade/>
+      </p:transition>
+    </mc:Fallback>
+  </mc:AlternateContent>
+</p:sld>
+</file>
+
+<file path=ppt/slides/slide14.xml><?xml version="1.0" encoding="utf-8"?>
+<p:sld xmlns:a="http://schemas.openxmlformats.org/drawingml/2006/main" xmlns:r="http://schemas.openxmlformats.org/officeDocument/2006/relationships" xmlns:p="http://schemas.openxmlformats.org/presentationml/2006/main">
+  <p:cSld>
+    <p:spTree>
+      <p:nvGrpSpPr>
+        <p:cNvPr id="1" name=""/>
+        <p:cNvGrpSpPr/>
+        <p:nvPr/>
+      </p:nvGrpSpPr>
+      <p:grpSpPr>
+        <a:xfrm>
+          <a:off x="0" y="0"/>
+          <a:ext cx="0" cy="0"/>
+          <a:chOff x="0" y="0"/>
+          <a:chExt cx="0" cy="0"/>
+        </a:xfrm>
+      </p:grpSpPr>
+    </p:spTree>
+    <p:extLst>
+      <p:ext uri="{BB962C8B-B14F-4D97-AF65-F5344CB8AC3E}">
+        <p14:creationId xmlns:p14="http://schemas.microsoft.com/office/powerpoint/2010/main" val="3030984589"/>
+      </p:ext>
+    </p:extLst>
+  </p:cSld>
+  <p:clrMapOvr>
+    <a:masterClrMapping/>
+  </p:clrMapOvr>
+  <mc:AlternateContent xmlns:mc="http://schemas.openxmlformats.org/markup-compatibility/2006" xmlns:p14="http://schemas.microsoft.com/office/powerpoint/2010/main">
+    <mc:Choice Requires="p14">
+      <p:transition spd="med" p14:dur="700">
+        <p:fade/>
+      </p:transition>
+    </mc:Choice>
+    <mc:Fallback xmlns="">
+      <p:transition spd="med">
+        <p:fade/>
+      </p:transition>
+    </mc:Fallback>
+  </mc:AlternateContent>
+</p:sld>
+</file>
+
+<file path=ppt/slides/slide15.xml><?xml version="1.0" encoding="utf-8"?>
+<p:sld xmlns:a="http://schemas.openxmlformats.org/drawingml/2006/main" xmlns:r="http://schemas.openxmlformats.org/officeDocument/2006/relationships" xmlns:p="http://schemas.openxmlformats.org/presentationml/2006/main">
+  <p:cSld>
+    <p:spTree>
+      <p:nvGrpSpPr>
+        <p:cNvPr id="1" name=""/>
+        <p:cNvGrpSpPr/>
+        <p:nvPr/>
+      </p:nvGrpSpPr>
+      <p:grpSpPr>
+        <a:xfrm>
+          <a:off x="0" y="0"/>
+          <a:ext cx="0" cy="0"/>
+          <a:chOff x="0" y="0"/>
+          <a:chExt cx="0" cy="0"/>
+        </a:xfrm>
+      </p:grpSpPr>
+      <p:sp>
+        <p:nvSpPr>
+          <p:cNvPr id="2" name="Title 1"/>
+          <p:cNvSpPr>
+            <a:spLocks noGrp="1"/>
+          </p:cNvSpPr>
+          <p:nvPr>
+            <p:ph type="title"/>
+          </p:nvPr>
+        </p:nvSpPr>
+        <p:spPr/>
+        <p:txBody>
+          <a:bodyPr/>
+          <a:lstStyle/>
+          <a:p>
+            <a:endParaRPr lang="en-US"/>
+          </a:p>
+        </p:txBody>
+      </p:sp>
+      <p:sp>
+        <p:nvSpPr>
+          <p:cNvPr id="3" name="Content Placeholder 2"/>
+          <p:cNvSpPr>
+            <a:spLocks noGrp="1"/>
+          </p:cNvSpPr>
+          <p:nvPr>
+            <p:ph idx="1"/>
+          </p:nvPr>
+        </p:nvSpPr>
+        <p:spPr/>
+        <p:txBody>
+          <a:bodyPr/>
+          <a:lstStyle/>
+          <a:p>
+            <a:endParaRPr lang="en-US"/>
+          </a:p>
+        </p:txBody>
+      </p:sp>
+      <p:sp>
+        <p:nvSpPr>
+          <p:cNvPr id="4" name="Text Placeholder 3"/>
+          <p:cNvSpPr>
+            <a:spLocks noGrp="1"/>
+          </p:cNvSpPr>
+          <p:nvPr>
+            <p:ph type="body" sz="half" idx="2"/>
+          </p:nvPr>
+        </p:nvSpPr>
+        <p:spPr/>
+        <p:txBody>
+          <a:bodyPr/>
+          <a:lstStyle/>
+          <a:p>
+            <a:endParaRPr lang="en-US"/>
+          </a:p>
+        </p:txBody>
+      </p:sp>
+    </p:spTree>
+    <p:extLst>
+      <p:ext uri="{BB962C8B-B14F-4D97-AF65-F5344CB8AC3E}">
+        <p14:creationId xmlns:p14="http://schemas.microsoft.com/office/powerpoint/2010/main" val="1750688946"/>
+      </p:ext>
+    </p:extLst>
+  </p:cSld>
+  <p:clrMapOvr>
+    <a:masterClrMapping/>
+  </p:clrMapOvr>
+  <mc:AlternateContent xmlns:mc="http://schemas.openxmlformats.org/markup-compatibility/2006" xmlns:p14="http://schemas.microsoft.com/office/powerpoint/2010/main">
+    <mc:Choice Requires="p14">
+      <p:transition spd="med" p14:dur="700">
+        <p:fade/>
+      </p:transition>
+    </mc:Choice>
+    <mc:Fallback xmlns="">
+      <p:transition spd="med">
+        <p:fade/>
+      </p:transition>
+    </mc:Fallback>
+  </mc:AlternateContent>
+</p:sld>
+</file>
+
+<file path=ppt/slides/slide16.xml><?xml version="1.0" encoding="utf-8"?>
+<p:sld xmlns:a="http://schemas.openxmlformats.org/drawingml/2006/main" xmlns:r="http://schemas.openxmlformats.org/officeDocument/2006/relationships" xmlns:p="http://schemas.openxmlformats.org/presentationml/2006/main">
+  <p:cSld>
+    <p:spTree>
+      <p:nvGrpSpPr>
+        <p:cNvPr id="1" name=""/>
+        <p:cNvGrpSpPr/>
+        <p:nvPr/>
+      </p:nvGrpSpPr>
+      <p:grpSpPr>
+        <a:xfrm>
+          <a:off x="0" y="0"/>
+          <a:ext cx="0" cy="0"/>
+          <a:chOff x="0" y="0"/>
+          <a:chExt cx="0" cy="0"/>
+        </a:xfrm>
+      </p:grpSpPr>
+      <p:sp>
+        <p:nvSpPr>
+          <p:cNvPr id="2" name="Title 1"/>
+          <p:cNvSpPr>
+            <a:spLocks noGrp="1"/>
+          </p:cNvSpPr>
+          <p:nvPr>
+            <p:ph type="title"/>
+          </p:nvPr>
+        </p:nvSpPr>
+        <p:spPr/>
+        <p:txBody>
+          <a:bodyPr/>
+          <a:lstStyle/>
+          <a:p>
+            <a:endParaRPr lang="en-US" dirty="0"/>
+          </a:p>
+        </p:txBody>
+      </p:sp>
+      <p:sp>
+        <p:nvSpPr>
+          <p:cNvPr id="4" name="Text Placeholder 3"/>
+          <p:cNvSpPr>
+            <a:spLocks noGrp="1"/>
+          </p:cNvSpPr>
+          <p:nvPr>
+            <p:ph type="body" sz="half" idx="2"/>
+          </p:nvPr>
+        </p:nvSpPr>
+        <p:spPr/>
+        <p:txBody>
+          <a:bodyPr/>
+          <a:lstStyle/>
+          <a:p>
+            <a:endParaRPr lang="en-US" dirty="0"/>
+          </a:p>
+        </p:txBody>
+      </p:sp>
+      <p:sp>
+        <p:nvSpPr>
+          <p:cNvPr id="3" name="Picture Placeholder 2"/>
+          <p:cNvSpPr>
+            <a:spLocks noGrp="1"/>
+          </p:cNvSpPr>
+          <p:nvPr>
+            <p:ph type="pic" idx="1"/>
+          </p:nvPr>
+        </p:nvSpPr>
+        <p:spPr/>
+      </p:sp>
+    </p:spTree>
+    <p:extLst>
+      <p:ext uri="{BB962C8B-B14F-4D97-AF65-F5344CB8AC3E}">
+        <p14:creationId xmlns:p14="http://schemas.microsoft.com/office/powerpoint/2010/main" val="3761302454"/>
+      </p:ext>
+    </p:extLst>
+  </p:cSld>
+  <p:clrMapOvr>
+    <a:masterClrMapping/>
+  </p:clrMapOvr>
+  <mc:AlternateContent xmlns:mc="http://schemas.openxmlformats.org/markup-compatibility/2006" xmlns:p14="http://schemas.microsoft.com/office/powerpoint/2010/main">
+    <mc:Choice Requires="p14">
+      <p:transition spd="med" p14:dur="700">
+        <p:fade/>
+      </p:transition>
+    </mc:Choice>
+    <mc:Fallback xmlns="">
+      <p:transition spd="med">
+        <p:fade/>
+      </p:transition>
+    </mc:Fallback>
+  </mc:AlternateContent>
+</p:sld>
+</file>
+
+<file path=ppt/slides/slide2.xml><?xml version="1.0" encoding="utf-8"?>
+<p:sld xmlns:a="http://schemas.openxmlformats.org/drawingml/2006/main" xmlns:r="http://schemas.openxmlformats.org/officeDocument/2006/relationships" xmlns:p="http://schemas.openxmlformats.org/presentationml/2006/main">
+  <p:cSld>
+    <p:spTree>
+      <p:nvGrpSpPr>
+        <p:cNvPr id="1" name=""/>
+        <p:cNvGrpSpPr/>
+        <p:nvPr/>
+      </p:nvGrpSpPr>
+      <p:grpSpPr>
+        <a:xfrm>
+          <a:off x="0" y="0"/>
+          <a:ext cx="0" cy="0"/>
+          <a:chOff x="0" y="0"/>
+          <a:chExt cx="0" cy="0"/>
+        </a:xfrm>
+      </p:grpSpPr>
+      <p:sp>
+        <p:nvSpPr>
+          <p:cNvPr id="13" name="Title 12"/>
+          <p:cNvSpPr>
+            <a:spLocks noGrp="1"/>
+          </p:cNvSpPr>
+          <p:nvPr>
+            <p:ph type="title"/>
+          </p:nvPr>
+        </p:nvSpPr>
+        <p:spPr/>
+        <p:txBody>
+          <a:bodyPr/>
+          <a:lstStyle/>
+          <a:p>
+            <a:r>
+              <a:rPr lang="en-US" dirty="0"/>
+              <a:t>Who am I</a:t>
+            </a:r>
+          </a:p>
+        </p:txBody>
+      </p:sp>
+      <p:sp>
+        <p:nvSpPr>
+          <p:cNvPr id="14" name="Content Placeholder 13"/>
+          <p:cNvSpPr>
+            <a:spLocks noGrp="1"/>
+          </p:cNvSpPr>
+          <p:nvPr>
+            <p:ph idx="1"/>
+          </p:nvPr>
+        </p:nvSpPr>
+        <p:spPr/>
+        <p:txBody>
+          <a:bodyPr/>
+          <a:lstStyle/>
+          <a:p>
+            <a:r>
+              <a:rPr lang="en-US" dirty="0"/>
+              <a:t>Shirak Avakian</a:t>
+            </a:r>
+          </a:p>
+          <a:p>
+            <a:r>
+              <a:rPr lang="en-US" dirty="0"/>
+              <a:t>Enterprise Solution Architect</a:t>
+            </a:r>
+          </a:p>
+          <a:p>
+            <a:r>
+              <a:rPr lang="en-US" dirty="0"/>
+              <a:t>QBI LLC</a:t>
+            </a:r>
+          </a:p>
+          <a:p>
+            <a:r>
+              <a:rPr lang="en-US" dirty="0"/>
+              <a:t>@</a:t>
+            </a:r>
+            <a:r>
+              <a:rPr lang="en-US" dirty="0" err="1"/>
+              <a:t>ShirakAvakian</a:t>
+            </a:r>
+            <a:endParaRPr lang="en-US" dirty="0"/>
+          </a:p>
+          <a:p>
+            <a:r>
+              <a:rPr lang="en-US" dirty="0"/>
+              <a:t>ShirakAvakian@gmail.com</a:t>
+            </a:r>
+          </a:p>
+        </p:txBody>
+      </p:sp>
+      <p:pic>
+        <p:nvPicPr>
+          <p:cNvPr id="4" name="Picture 3"/>
+          <p:cNvPicPr>
+            <a:picLocks noChangeAspect="1"/>
+          </p:cNvPicPr>
+          <p:nvPr/>
+        </p:nvPicPr>
+        <p:blipFill rotWithShape="1">
+          <a:blip r:embed="rId2" cstate="print">
+            <a:extLst>
+              <a:ext uri="{28A0092B-C50C-407E-A947-70E740481C1C}">
+                <a14:useLocalDpi xmlns:a14="http://schemas.microsoft.com/office/drawing/2010/main" val="0"/>
+              </a:ext>
+            </a:extLst>
+          </a:blip>
+          <a:srcRect l="28031" r="12878"/>
+          <a:stretch/>
+        </p:blipFill>
+        <p:spPr>
+          <a:xfrm>
+            <a:off x="6323012" y="1060391"/>
+            <a:ext cx="4343402" cy="4134584"/>
+          </a:xfrm>
+          <a:prstGeom prst="roundRect">
+            <a:avLst>
+              <a:gd name="adj" fmla="val 11111"/>
+            </a:avLst>
+          </a:prstGeom>
+          <a:ln w="190500" cap="rnd">
+            <a:solidFill>
+              <a:srgbClr val="C8C6BD"/>
+            </a:solidFill>
+            <a:prstDash val="solid"/>
+          </a:ln>
+          <a:effectLst>
+            <a:outerShdw blurRad="101600" dist="50800" dir="7200000" algn="tl" rotWithShape="0">
+              <a:srgbClr val="000000">
+                <a:alpha val="45000"/>
+              </a:srgbClr>
+            </a:outerShdw>
+          </a:effectLst>
+          <a:scene3d>
+            <a:camera prst="perspectiveFront" fov="5400000"/>
+            <a:lightRig rig="threePt" dir="t">
+              <a:rot lat="0" lon="0" rev="19200000"/>
+            </a:lightRig>
+          </a:scene3d>
+          <a:sp3d extrusionH="25400">
+            <a:bevelT w="304800" h="152400" prst="hardEdge"/>
+            <a:extrusionClr>
+              <a:srgbClr val="FFFFFF"/>
+            </a:extrusionClr>
+          </a:sp3d>
+        </p:spPr>
+      </p:pic>
+    </p:spTree>
+    <p:extLst>
+      <p:ext uri="{BB962C8B-B14F-4D97-AF65-F5344CB8AC3E}">
+        <p14:creationId xmlns:p14="http://schemas.microsoft.com/office/powerpoint/2010/main" val="711182959"/>
+      </p:ext>
+    </p:extLst>
+  </p:cSld>
+  <p:clrMapOvr>
+    <a:masterClrMapping/>
+  </p:clrMapOvr>
+  <mc:AlternateContent xmlns:mc="http://schemas.openxmlformats.org/markup-compatibility/2006" xmlns:p14="http://schemas.microsoft.com/office/powerpoint/2010/main">
+    <mc:Choice Requires="p14">
+      <p:transition spd="med" p14:dur="700">
+        <p:fade/>
+      </p:transition>
+    </mc:Choice>
+    <mc:Fallback xmlns="">
+      <p:transition spd="med">
+        <p:fade/>
+      </p:transition>
+    </mc:Fallback>
+  </mc:AlternateContent>
+</p:sld>
+</file>
+
+<file path=ppt/slides/slide3.xml><?xml version="1.0" encoding="utf-8"?>
+<p:sld xmlns:a="http://schemas.openxmlformats.org/drawingml/2006/main" xmlns:r="http://schemas.openxmlformats.org/officeDocument/2006/relationships" xmlns:p="http://schemas.openxmlformats.org/presentationml/2006/main">
+  <p:cSld>
+    <p:spTree>
+      <p:nvGrpSpPr>
+        <p:cNvPr id="1" name=""/>
+        <p:cNvGrpSpPr/>
+        <p:nvPr/>
+      </p:nvGrpSpPr>
+      <p:grpSpPr>
+        <a:xfrm>
+          <a:off x="0" y="0"/>
+          <a:ext cx="0" cy="0"/>
+          <a:chOff x="0" y="0"/>
+          <a:chExt cx="0" cy="0"/>
+        </a:xfrm>
+      </p:grpSpPr>
+      <p:sp>
+        <p:nvSpPr>
+          <p:cNvPr id="4" name="Title 12"/>
+          <p:cNvSpPr>
+            <a:spLocks noGrp="1"/>
+          </p:cNvSpPr>
+          <p:nvPr>
+            <p:ph type="title"/>
+          </p:nvPr>
+        </p:nvSpPr>
+        <p:spPr>
+          <a:xfrm>
+            <a:off x="836613" y="533400"/>
+            <a:ext cx="4495800" cy="609600"/>
+          </a:xfrm>
+        </p:spPr>
+        <p:txBody>
+          <a:bodyPr>
+            <a:noAutofit/>
+          </a:bodyPr>
+          <a:lstStyle/>
+          <a:p>
+            <a:r>
+              <a:rPr lang="en-US" sz="3600" dirty="0"/>
+              <a:t>What is PDF</a:t>
+            </a:r>
+          </a:p>
+        </p:txBody>
+      </p:sp>
+      <p:sp>
+        <p:nvSpPr>
+          <p:cNvPr id="5" name="TextBox 4"/>
+          <p:cNvSpPr txBox="1"/>
+          <p:nvPr/>
+        </p:nvSpPr>
+        <p:spPr>
+          <a:xfrm>
+            <a:off x="836612" y="1295400"/>
+            <a:ext cx="6832320" cy="1323439"/>
+          </a:xfrm>
+          <a:prstGeom prst="rect">
+            <a:avLst/>
+          </a:prstGeom>
+          <a:noFill/>
+        </p:spPr>
+        <p:txBody>
+          <a:bodyPr wrap="none" rtlCol="0">
+            <a:spAutoFit/>
+          </a:bodyPr>
+          <a:lstStyle/>
+          <a:p>
+            <a:r>
+              <a:rPr lang="en-US" sz="2000" dirty="0"/>
+              <a:t>Portable Document Format (PDF) is a file format used </a:t>
+            </a:r>
+          </a:p>
+          <a:p>
+            <a:r>
+              <a:rPr lang="en-US" sz="2000" dirty="0"/>
+              <a:t>to present and exchange documents reliably, </a:t>
+            </a:r>
+          </a:p>
+          <a:p>
+            <a:r>
+              <a:rPr lang="en-US" sz="2000" dirty="0"/>
+              <a:t>independent of software, hardware, or operating </a:t>
+            </a:r>
+          </a:p>
+          <a:p>
+            <a:r>
+              <a:rPr lang="en-US" sz="2000" dirty="0"/>
+              <a:t>system. </a:t>
+            </a:r>
+          </a:p>
+        </p:txBody>
+      </p:sp>
+      <p:sp>
+        <p:nvSpPr>
+          <p:cNvPr id="6" name="TextBox 5"/>
+          <p:cNvSpPr txBox="1"/>
+          <p:nvPr/>
+        </p:nvSpPr>
+        <p:spPr>
+          <a:xfrm>
+            <a:off x="912812" y="3811012"/>
+            <a:ext cx="6522940" cy="1938992"/>
+          </a:xfrm>
+          <a:prstGeom prst="rect">
+            <a:avLst/>
+          </a:prstGeom>
+          <a:noFill/>
+        </p:spPr>
+        <p:txBody>
+          <a:bodyPr wrap="none" rtlCol="0">
+            <a:spAutoFit/>
+          </a:bodyPr>
+          <a:lstStyle/>
+          <a:p>
+            <a:pPr marL="342900" indent="-342900">
+              <a:buFont typeface="Arial" panose="020B0604020202020204" pitchFamily="34" charset="0"/>
+              <a:buChar char="•"/>
+            </a:pPr>
+            <a:r>
+              <a:rPr lang="en-US" sz="2000" dirty="0"/>
+              <a:t>Invented by Adobe.</a:t>
+            </a:r>
+          </a:p>
+          <a:p>
+            <a:pPr marL="342900" indent="-342900">
+              <a:buFont typeface="Arial" panose="020B0604020202020204" pitchFamily="34" charset="0"/>
+              <a:buChar char="•"/>
+            </a:pPr>
+            <a:r>
+              <a:rPr lang="en-US" sz="2000" dirty="0"/>
+              <a:t>Open standard maintained by the International </a:t>
+            </a:r>
+          </a:p>
+          <a:p>
+            <a:r>
+              <a:rPr lang="en-US" sz="2000" dirty="0"/>
+              <a:t>     Organization for Standardization (ISO). </a:t>
+            </a:r>
+          </a:p>
+          <a:p>
+            <a:pPr marL="342900" indent="-342900">
+              <a:buFont typeface="Arial" panose="020B0604020202020204" pitchFamily="34" charset="0"/>
+              <a:buChar char="•"/>
+            </a:pPr>
+            <a:r>
+              <a:rPr lang="en-US" sz="2000" dirty="0"/>
+              <a:t>Can contain links and buttons, form fields, </a:t>
+            </a:r>
+          </a:p>
+          <a:p>
+            <a:r>
+              <a:rPr lang="en-US" sz="2000" dirty="0"/>
+              <a:t>     audio, video, and business logic. </a:t>
+            </a:r>
+          </a:p>
+          <a:p>
+            <a:pPr marL="342900" indent="-342900">
+              <a:buFont typeface="Arial" panose="020B0604020202020204" pitchFamily="34" charset="0"/>
+              <a:buChar char="•"/>
+            </a:pPr>
+            <a:r>
+              <a:rPr lang="en-US" sz="2000" dirty="0"/>
+              <a:t>Can also be signed electronically</a:t>
+            </a:r>
+          </a:p>
+        </p:txBody>
+      </p:sp>
+      <p:sp>
+        <p:nvSpPr>
+          <p:cNvPr id="7" name="Title 12"/>
+          <p:cNvSpPr txBox="1">
+            <a:spLocks/>
+          </p:cNvSpPr>
+          <p:nvPr/>
+        </p:nvSpPr>
+        <p:spPr>
+          <a:xfrm>
+            <a:off x="836612" y="3207960"/>
+            <a:ext cx="6400800" cy="838200"/>
+          </a:xfrm>
+          <a:prstGeom prst="rect">
+            <a:avLst/>
+          </a:prstGeom>
+        </p:spPr>
+        <p:txBody>
+          <a:bodyPr vert="horz" lIns="121899" tIns="60949" rIns="121899" bIns="60949" rtlCol="0" anchor="t">
+            <a:normAutofit/>
+          </a:bodyPr>
+          <a:lstStyle>
+            <a:lvl1pPr algn="l" defTabSz="1218987" rtl="0" eaLnBrk="1" latinLnBrk="0" hangingPunct="1">
+              <a:lnSpc>
+                <a:spcPct val="85000"/>
+              </a:lnSpc>
+              <a:spcBef>
+                <a:spcPct val="0"/>
+              </a:spcBef>
+              <a:buNone/>
+              <a:tabLst/>
+              <a:defRPr sz="5400" b="0" kern="1200" cap="none" baseline="0">
+                <a:solidFill>
+                  <a:schemeClr val="tx1"/>
+                </a:solidFill>
+                <a:latin typeface="+mj-lt"/>
+                <a:ea typeface="+mj-ea"/>
+                <a:cs typeface="+mj-cs"/>
+              </a:defRPr>
+            </a:lvl1pPr>
+          </a:lstStyle>
+          <a:p>
+            <a:r>
+              <a:rPr lang="en-US" sz="3600" dirty="0"/>
+              <a:t>Some Facts About PDF</a:t>
+            </a:r>
+          </a:p>
+        </p:txBody>
+      </p:sp>
+    </p:spTree>
+    <p:extLst>
+      <p:ext uri="{BB962C8B-B14F-4D97-AF65-F5344CB8AC3E}">
+        <p14:creationId xmlns:p14="http://schemas.microsoft.com/office/powerpoint/2010/main" val="1997697987"/>
+      </p:ext>
+    </p:extLst>
+  </p:cSld>
+  <p:clrMapOvr>
+    <a:masterClrMapping/>
+  </p:clrMapOvr>
+  <mc:AlternateContent xmlns:mc="http://schemas.openxmlformats.org/markup-compatibility/2006" xmlns:p14="http://schemas.microsoft.com/office/powerpoint/2010/main">
+    <mc:Choice Requires="p14">
+      <p:transition spd="med" p14:dur="700">
+        <p:fade/>
+      </p:transition>
+    </mc:Choice>
+    <mc:Fallback xmlns="">
+      <p:transition spd="med">
+        <p:fade/>
+      </p:transition>
+    </mc:Fallback>
+  </mc:AlternateContent>
+</p:sld>
+</file>
+
+<file path=ppt/slides/slide4.xml><?xml version="1.0" encoding="utf-8"?>
+<p:sld xmlns:a="http://schemas.openxmlformats.org/drawingml/2006/main" xmlns:r="http://schemas.openxmlformats.org/officeDocument/2006/relationships" xmlns:p="http://schemas.openxmlformats.org/presentationml/2006/main">
+  <p:cSld>
+    <p:spTree>
+      <p:nvGrpSpPr>
+        <p:cNvPr id="1" name=""/>
+        <p:cNvGrpSpPr/>
+        <p:nvPr/>
+      </p:nvGrpSpPr>
+      <p:grpSpPr>
+        <a:xfrm>
+          <a:off x="0" y="0"/>
+          <a:ext cx="0" cy="0"/>
+          <a:chOff x="0" y="0"/>
+          <a:chExt cx="0" cy="0"/>
+        </a:xfrm>
+      </p:grpSpPr>
+      <p:sp>
+        <p:nvSpPr>
+          <p:cNvPr id="2" name="Title 1"/>
+          <p:cNvSpPr>
+            <a:spLocks noGrp="1"/>
+          </p:cNvSpPr>
+          <p:nvPr>
+            <p:ph type="title"/>
+          </p:nvPr>
+        </p:nvSpPr>
+        <p:spPr/>
+        <p:txBody>
+          <a:bodyPr/>
+          <a:lstStyle/>
+          <a:p>
+            <a:r>
+              <a:rPr lang="en-US" sz="3600" dirty="0"/>
+              <a:t>History</a:t>
+            </a:r>
+            <a:endParaRPr lang="en-US" dirty="0"/>
+          </a:p>
+        </p:txBody>
+      </p:sp>
+      <p:sp>
+        <p:nvSpPr>
+          <p:cNvPr id="5" name="Content Placeholder 4"/>
+          <p:cNvSpPr>
+            <a:spLocks noGrp="1"/>
+          </p:cNvSpPr>
+          <p:nvPr>
+            <p:ph sz="half" idx="1"/>
+          </p:nvPr>
+        </p:nvSpPr>
+        <p:spPr>
+          <a:xfrm>
+            <a:off x="1117309" y="1701800"/>
+            <a:ext cx="5891504" cy="4470400"/>
+          </a:xfrm>
+        </p:spPr>
+        <p:txBody>
+          <a:bodyPr/>
+          <a:lstStyle/>
+          <a:p>
+            <a:r>
+              <a:rPr lang="en-US" sz="2000" dirty="0"/>
+              <a:t>In 1991, Adobe cofounder Dr. John Warnock launched the paper-to-digital revolution with an idea he called The Camelot Project. </a:t>
+            </a:r>
+          </a:p>
+          <a:p>
+            <a:r>
+              <a:rPr lang="en-US" sz="2000" dirty="0"/>
+              <a:t>By 1992, Camelot had developed into PDF. Today, it is the format trusted by businesses </a:t>
+            </a:r>
+            <a:r>
+              <a:rPr lang="en-US" dirty="0"/>
+              <a:t>around the </a:t>
+            </a:r>
+            <a:r>
+              <a:rPr lang="en-US" sz="2000" dirty="0"/>
+              <a:t>world.</a:t>
+            </a:r>
+          </a:p>
+          <a:p>
+            <a:r>
+              <a:rPr lang="en-US" sz="2000" dirty="0"/>
+              <a:t>Today, Warnock's vision is alive, well, and evolving. Adobe PDFs preserve all the data in the original file - even when text, graphics, spreadsheets, and more</a:t>
+            </a:r>
+            <a:endParaRPr lang="en-US" sz="1800" dirty="0"/>
+          </a:p>
+        </p:txBody>
+      </p:sp>
+      <p:pic>
+        <p:nvPicPr>
+          <p:cNvPr id="4" name="Picture 3"/>
+          <p:cNvPicPr>
+            <a:picLocks noChangeAspect="1"/>
+          </p:cNvPicPr>
+          <p:nvPr/>
+        </p:nvPicPr>
+        <p:blipFill>
+          <a:blip r:embed="rId2">
+            <a:extLst>
+              <a:ext uri="{28A0092B-C50C-407E-A947-70E740481C1C}">
+                <a14:useLocalDpi xmlns:a14="http://schemas.microsoft.com/office/drawing/2010/main" val="0"/>
+              </a:ext>
+            </a:extLst>
+          </a:blip>
+          <a:stretch>
+            <a:fillRect/>
+          </a:stretch>
+        </p:blipFill>
+        <p:spPr>
+          <a:xfrm>
+            <a:off x="7313612" y="1701800"/>
+            <a:ext cx="4257675" cy="2286000"/>
+          </a:xfrm>
+          <a:prstGeom prst="rect">
+            <a:avLst/>
+          </a:prstGeom>
+          <a:ln w="190500" cap="sq">
+            <a:solidFill>
+              <a:srgbClr val="C8C6BD"/>
+            </a:solidFill>
+            <a:prstDash val="solid"/>
+            <a:miter lim="800000"/>
+          </a:ln>
+          <a:effectLst>
+            <a:outerShdw blurRad="254000" algn="bl" rotWithShape="0">
+              <a:srgbClr val="000000">
+                <a:alpha val="43000"/>
+              </a:srgbClr>
+            </a:outerShdw>
+          </a:effectLst>
+          <a:scene3d>
+            <a:camera prst="perspectiveFront" fov="5400000"/>
+            <a:lightRig rig="threePt" dir="t">
+              <a:rot lat="0" lon="0" rev="2100000"/>
+            </a:lightRig>
+          </a:scene3d>
+          <a:sp3d extrusionH="25400">
+            <a:bevelT w="304800" h="152400" prst="hardEdge"/>
+            <a:extrusionClr>
+              <a:srgbClr val="000000"/>
+            </a:extrusionClr>
+          </a:sp3d>
+        </p:spPr>
+      </p:pic>
+    </p:spTree>
+    <p:extLst>
+      <p:ext uri="{BB962C8B-B14F-4D97-AF65-F5344CB8AC3E}">
+        <p14:creationId xmlns:p14="http://schemas.microsoft.com/office/powerpoint/2010/main" val="1157616808"/>
+      </p:ext>
+    </p:extLst>
+  </p:cSld>
+  <p:clrMapOvr>
+    <a:masterClrMapping/>
+  </p:clrMapOvr>
+  <mc:AlternateContent xmlns:mc="http://schemas.openxmlformats.org/markup-compatibility/2006" xmlns:p14="http://schemas.microsoft.com/office/powerpoint/2010/main">
+    <mc:Choice Requires="p14">
+      <p:transition spd="med" p14:dur="700">
+        <p:fade/>
+      </p:transition>
+    </mc:Choice>
+    <mc:Fallback xmlns="">
+      <p:transition spd="med">
+        <p:fade/>
+      </p:transition>
+    </mc:Fallback>
+  </mc:AlternateContent>
+</p:sld>
+</file>
+
+<file path=ppt/slides/slide5.xml><?xml version="1.0" encoding="utf-8"?>
+<p:sld xmlns:a="http://schemas.openxmlformats.org/drawingml/2006/main" xmlns:r="http://schemas.openxmlformats.org/officeDocument/2006/relationships" xmlns:p="http://schemas.openxmlformats.org/presentationml/2006/main">
+  <p:cSld>
+    <p:spTree>
+      <p:nvGrpSpPr>
+        <p:cNvPr id="1" name=""/>
+        <p:cNvGrpSpPr/>
+        <p:nvPr/>
+      </p:nvGrpSpPr>
+      <p:grpSpPr>
+        <a:xfrm>
+          <a:off x="0" y="0"/>
+          <a:ext cx="0" cy="0"/>
+          <a:chOff x="0" y="0"/>
+          <a:chExt cx="0" cy="0"/>
+        </a:xfrm>
+      </p:grpSpPr>
+      <p:sp>
+        <p:nvSpPr>
+          <p:cNvPr id="2" name="Title 1"/>
+          <p:cNvSpPr>
+            <a:spLocks noGrp="1"/>
+          </p:cNvSpPr>
+          <p:nvPr>
+            <p:ph type="title"/>
+          </p:nvPr>
+        </p:nvSpPr>
+        <p:spPr/>
+        <p:txBody>
+          <a:bodyPr/>
+          <a:lstStyle/>
+          <a:p>
+            <a:r>
+              <a:rPr lang="en-US" sz="3600" dirty="0"/>
+              <a:t>Security</a:t>
+            </a:r>
+            <a:endParaRPr lang="en-US" dirty="0"/>
+          </a:p>
+        </p:txBody>
+      </p:sp>
+      <p:sp>
+        <p:nvSpPr>
+          <p:cNvPr id="5" name="Content Placeholder 4"/>
+          <p:cNvSpPr>
+            <a:spLocks noGrp="1"/>
+          </p:cNvSpPr>
+          <p:nvPr>
+            <p:ph sz="half" idx="1"/>
+          </p:nvPr>
+        </p:nvSpPr>
+        <p:spPr>
+          <a:xfrm>
+            <a:off x="1117309" y="1701800"/>
+            <a:ext cx="5891504" cy="2870200"/>
+          </a:xfrm>
+        </p:spPr>
+        <p:txBody>
+          <a:bodyPr/>
+          <a:lstStyle/>
+          <a:p>
+            <a:r>
+              <a:rPr lang="en-US" sz="2000" dirty="0"/>
+              <a:t>Password protect your PDF </a:t>
+            </a:r>
+          </a:p>
+          <a:p>
+            <a:r>
+              <a:rPr lang="en-US" sz="2000" dirty="0"/>
+              <a:t>Redact </a:t>
+            </a:r>
+            <a:r>
+              <a:rPr lang="en-US" dirty="0"/>
+              <a:t>sensitive information</a:t>
+            </a:r>
+            <a:endParaRPr lang="en-US" sz="2000" dirty="0"/>
+          </a:p>
+          <a:p>
+            <a:r>
+              <a:rPr lang="en-US" sz="2000" dirty="0"/>
+              <a:t>Sanitization—Remove hidden data from PDF</a:t>
+            </a:r>
+          </a:p>
+          <a:p>
+            <a:r>
+              <a:rPr lang="en-US" sz="2000" dirty="0"/>
+              <a:t>Digitally sign the PDF using private/public key pair </a:t>
+            </a:r>
+            <a:endParaRPr lang="en-US" sz="1800" dirty="0"/>
+          </a:p>
+        </p:txBody>
+      </p:sp>
+      <p:pic>
+        <p:nvPicPr>
+          <p:cNvPr id="3" name="Picture 2"/>
+          <p:cNvPicPr>
+            <a:picLocks noChangeAspect="1"/>
+          </p:cNvPicPr>
+          <p:nvPr/>
+        </p:nvPicPr>
+        <p:blipFill>
+          <a:blip r:embed="rId2">
+            <a:extLst>
+              <a:ext uri="{28A0092B-C50C-407E-A947-70E740481C1C}">
+                <a14:useLocalDpi xmlns:a14="http://schemas.microsoft.com/office/drawing/2010/main" val="0"/>
+              </a:ext>
+            </a:extLst>
+          </a:blip>
+          <a:stretch>
+            <a:fillRect/>
+          </a:stretch>
+        </p:blipFill>
+        <p:spPr>
+          <a:xfrm>
+            <a:off x="8075612" y="1828800"/>
+            <a:ext cx="2284922" cy="2284922"/>
+          </a:xfrm>
+          <a:prstGeom prst="rect">
+            <a:avLst/>
+          </a:prstGeom>
+        </p:spPr>
+      </p:pic>
+    </p:spTree>
+    <p:extLst>
+      <p:ext uri="{BB962C8B-B14F-4D97-AF65-F5344CB8AC3E}">
+        <p14:creationId xmlns:p14="http://schemas.microsoft.com/office/powerpoint/2010/main" val="3573450425"/>
+      </p:ext>
+    </p:extLst>
+  </p:cSld>
+  <p:clrMapOvr>
+    <a:masterClrMapping/>
+  </p:clrMapOvr>
+  <mc:AlternateContent xmlns:mc="http://schemas.openxmlformats.org/markup-compatibility/2006" xmlns:p14="http://schemas.microsoft.com/office/powerpoint/2010/main">
+    <mc:Choice Requires="p14">
+      <p:transition spd="med" p14:dur="700">
+        <p:fade/>
+      </p:transition>
+    </mc:Choice>
+    <mc:Fallback xmlns="">
+      <p:transition spd="med">
+        <p:fade/>
+      </p:transition>
+    </mc:Fallback>
+  </mc:AlternateContent>
+</p:sld>
+</file>
+
+<file path=ppt/slides/slide6.xml><?xml version="1.0" encoding="utf-8"?>
+<p:sld xmlns:a="http://schemas.openxmlformats.org/drawingml/2006/main" xmlns:r="http://schemas.openxmlformats.org/officeDocument/2006/relationships" xmlns:p="http://schemas.openxmlformats.org/presentationml/2006/main">
+  <p:cSld>
+    <p:spTree>
+      <p:nvGrpSpPr>
+        <p:cNvPr id="1" name=""/>
+        <p:cNvGrpSpPr/>
+        <p:nvPr/>
+      </p:nvGrpSpPr>
+      <p:grpSpPr>
+        <a:xfrm>
+          <a:off x="0" y="0"/>
+          <a:ext cx="0" cy="0"/>
+          <a:chOff x="0" y="0"/>
+          <a:chExt cx="0" cy="0"/>
+        </a:xfrm>
+      </p:grpSpPr>
+      <p:sp>
+        <p:nvSpPr>
+          <p:cNvPr id="2" name="Title 1"/>
+          <p:cNvSpPr>
+            <a:spLocks noGrp="1"/>
+          </p:cNvSpPr>
+          <p:nvPr>
+            <p:ph type="title"/>
+          </p:nvPr>
+        </p:nvSpPr>
+        <p:spPr/>
+        <p:txBody>
+          <a:bodyPr/>
+          <a:lstStyle/>
+          <a:p>
+            <a:r>
+              <a:rPr lang="en-US" sz="3600" dirty="0"/>
+              <a:t>Conclusion</a:t>
+            </a:r>
+            <a:endParaRPr lang="en-US" dirty="0"/>
+          </a:p>
+        </p:txBody>
+      </p:sp>
+      <p:sp>
+        <p:nvSpPr>
+          <p:cNvPr id="5" name="Content Placeholder 4"/>
+          <p:cNvSpPr>
+            <a:spLocks noGrp="1"/>
+          </p:cNvSpPr>
+          <p:nvPr>
+            <p:ph sz="half" idx="1"/>
+          </p:nvPr>
+        </p:nvSpPr>
+        <p:spPr>
+          <a:xfrm>
+            <a:off x="1117309" y="1701800"/>
+            <a:ext cx="5891504" cy="3708400"/>
+          </a:xfrm>
+        </p:spPr>
+        <p:txBody>
+          <a:bodyPr>
+            <a:normAutofit/>
+          </a:bodyPr>
+          <a:lstStyle/>
+          <a:p>
+            <a:r>
+              <a:rPr lang="en-US" sz="2000" dirty="0"/>
+              <a:t>If you can share &amp; reduce physical occupation of 1000 books to 1000 PDF digital files resting in your lap. </a:t>
+            </a:r>
+          </a:p>
+          <a:p>
+            <a:r>
+              <a:rPr lang="en-US" sz="2000" dirty="0"/>
+              <a:t>If you can search for files, pages within seconds</a:t>
+            </a:r>
+          </a:p>
+          <a:p>
+            <a:r>
+              <a:rPr lang="en-US" sz="2000" dirty="0"/>
+              <a:t>If you can sign, edit, comment, stamp PDF</a:t>
+            </a:r>
+          </a:p>
+          <a:p>
+            <a:r>
+              <a:rPr lang="en-US" sz="2000" dirty="0"/>
+              <a:t>If you can secure a PDF</a:t>
+            </a:r>
+          </a:p>
+          <a:p>
+            <a:r>
+              <a:rPr lang="en-US" sz="2000" dirty="0"/>
+              <a:t>If all above can be done by a PDF, shouldn’t we call it SMART?</a:t>
+            </a:r>
+          </a:p>
+        </p:txBody>
+      </p:sp>
+      <p:pic>
+        <p:nvPicPr>
+          <p:cNvPr id="4" name="Picture 3"/>
+          <p:cNvPicPr>
+            <a:picLocks noChangeAspect="1"/>
+          </p:cNvPicPr>
+          <p:nvPr/>
+        </p:nvPicPr>
+        <p:blipFill>
+          <a:blip r:embed="rId2" cstate="print">
+            <a:extLst>
+              <a:ext uri="{28A0092B-C50C-407E-A947-70E740481C1C}">
+                <a14:useLocalDpi xmlns:a14="http://schemas.microsoft.com/office/drawing/2010/main" val="0"/>
+              </a:ext>
+            </a:extLst>
+          </a:blip>
+          <a:stretch>
+            <a:fillRect/>
+          </a:stretch>
+        </p:blipFill>
+        <p:spPr>
+          <a:xfrm>
+            <a:off x="7011799" y="1701800"/>
+            <a:ext cx="4721651" cy="3022600"/>
+          </a:xfrm>
+          <a:prstGeom prst="rect">
+            <a:avLst/>
+          </a:prstGeom>
+          <a:ln w="190500" cap="sq">
+            <a:solidFill>
+              <a:srgbClr val="C8C6BD"/>
+            </a:solidFill>
+            <a:prstDash val="solid"/>
+            <a:miter lim="800000"/>
+          </a:ln>
+          <a:effectLst>
+            <a:outerShdw blurRad="254000" algn="bl" rotWithShape="0">
+              <a:srgbClr val="000000">
+                <a:alpha val="43000"/>
+              </a:srgbClr>
+            </a:outerShdw>
+          </a:effectLst>
+          <a:scene3d>
+            <a:camera prst="perspectiveFront" fov="5400000"/>
+            <a:lightRig rig="threePt" dir="t">
+              <a:rot lat="0" lon="0" rev="2100000"/>
+            </a:lightRig>
+          </a:scene3d>
+          <a:sp3d extrusionH="25400">
+            <a:bevelT w="304800" h="152400" prst="hardEdge"/>
+            <a:extrusionClr>
+              <a:srgbClr val="000000"/>
+            </a:extrusionClr>
+          </a:sp3d>
+        </p:spPr>
+      </p:pic>
+      <p:pic>
+        <p:nvPicPr>
+          <p:cNvPr id="6" name="Picture 5"/>
+          <p:cNvPicPr>
+            <a:picLocks noChangeAspect="1"/>
+          </p:cNvPicPr>
+          <p:nvPr/>
+        </p:nvPicPr>
+        <p:blipFill>
+          <a:blip r:embed="rId3" cstate="print">
+            <a:extLst>
+              <a:ext uri="{28A0092B-C50C-407E-A947-70E740481C1C}">
+                <a14:useLocalDpi xmlns:a14="http://schemas.microsoft.com/office/drawing/2010/main" val="0"/>
+              </a:ext>
+            </a:extLst>
+          </a:blip>
+          <a:stretch>
+            <a:fillRect/>
+          </a:stretch>
+        </p:blipFill>
+        <p:spPr>
+          <a:xfrm>
+            <a:off x="10666413" y="1905000"/>
+            <a:ext cx="874276" cy="874276"/>
+          </a:xfrm>
+          <a:prstGeom prst="rect">
+            <a:avLst/>
+          </a:prstGeom>
+        </p:spPr>
+      </p:pic>
+    </p:spTree>
+    <p:extLst>
+      <p:ext uri="{BB962C8B-B14F-4D97-AF65-F5344CB8AC3E}">
+        <p14:creationId xmlns:p14="http://schemas.microsoft.com/office/powerpoint/2010/main" val="1249482091"/>
+      </p:ext>
+    </p:extLst>
+  </p:cSld>
+  <p:clrMapOvr>
+    <a:masterClrMapping/>
+  </p:clrMapOvr>
+  <mc:AlternateContent xmlns:mc="http://schemas.openxmlformats.org/markup-compatibility/2006" xmlns:p14="http://schemas.microsoft.com/office/powerpoint/2010/main">
+    <mc:Choice Requires="p14">
+      <p:transition spd="med" p14:dur="700">
+        <p:fade/>
+      </p:transition>
+    </mc:Choice>
+    <mc:Fallback xmlns="">
+      <p:transition spd="med">
+        <p:fade/>
+      </p:transition>
+    </mc:Fallback>
+  </mc:AlternateContent>
+</p:sld>
+</file>
+
+<file path=ppt/slides/slide7.xml><?xml version="1.0" encoding="utf-8"?>
+<p:sld xmlns:a="http://schemas.openxmlformats.org/drawingml/2006/main" xmlns:r="http://schemas.openxmlformats.org/officeDocument/2006/relationships" xmlns:p="http://schemas.openxmlformats.org/presentationml/2006/main">
+  <p:cSld>
+    <p:spTree>
+      <p:nvGrpSpPr>
+        <p:cNvPr id="1" name=""/>
+        <p:cNvGrpSpPr/>
+        <p:nvPr/>
+      </p:nvGrpSpPr>
+      <p:grpSpPr>
+        <a:xfrm>
+          <a:off x="0" y="0"/>
+          <a:ext cx="0" cy="0"/>
+          <a:chOff x="0" y="0"/>
+          <a:chExt cx="0" cy="0"/>
+        </a:xfrm>
+      </p:grpSpPr>
+      <p:sp>
+        <p:nvSpPr>
+          <p:cNvPr id="2" name="Title 1"/>
+          <p:cNvSpPr>
+            <a:spLocks noGrp="1"/>
+          </p:cNvSpPr>
+          <p:nvPr>
+            <p:ph type="title"/>
+          </p:nvPr>
+        </p:nvSpPr>
+        <p:spPr>
+          <a:xfrm>
+            <a:off x="989012" y="76199"/>
+            <a:ext cx="10157354" cy="1397000"/>
+          </a:xfrm>
+        </p:spPr>
+        <p:txBody>
+          <a:bodyPr/>
+          <a:lstStyle/>
+          <a:p>
+            <a:pPr algn="ctr"/>
+            <a:r>
+              <a:rPr lang="en-US" sz="3600" dirty="0"/>
+              <a:t>Not yet, until we make it smarter by</a:t>
+            </a:r>
+            <a:endParaRPr lang="en-US" dirty="0"/>
+          </a:p>
+        </p:txBody>
+      </p:sp>
+      <p:sp>
+        <p:nvSpPr>
+          <p:cNvPr id="7" name="Content Placeholder 4"/>
+          <p:cNvSpPr>
+            <a:spLocks noGrp="1"/>
+          </p:cNvSpPr>
+          <p:nvPr>
+            <p:ph sz="half" idx="1"/>
+          </p:nvPr>
+        </p:nvSpPr>
+        <p:spPr>
+          <a:xfrm>
+            <a:off x="1827212" y="3581400"/>
+            <a:ext cx="6248400" cy="1143000"/>
+          </a:xfrm>
+        </p:spPr>
+        <p:txBody>
+          <a:bodyPr>
+            <a:normAutofit/>
+          </a:bodyPr>
+          <a:lstStyle/>
+          <a:p>
+            <a:r>
+              <a:rPr lang="en-US" sz="2000" dirty="0"/>
+              <a:t>Custom Properties</a:t>
+            </a:r>
+          </a:p>
+          <a:p>
+            <a:r>
+              <a:rPr lang="en-US" sz="2000" dirty="0"/>
+              <a:t>Barcode</a:t>
+            </a:r>
+          </a:p>
+        </p:txBody>
+      </p:sp>
+      <p:sp>
+        <p:nvSpPr>
+          <p:cNvPr id="8" name="Rectangle 7"/>
+          <p:cNvSpPr/>
+          <p:nvPr/>
+        </p:nvSpPr>
+        <p:spPr>
+          <a:xfrm>
+            <a:off x="3324489" y="1823134"/>
+            <a:ext cx="5486400" cy="646331"/>
+          </a:xfrm>
+          <a:prstGeom prst="rect">
+            <a:avLst/>
+          </a:prstGeom>
+        </p:spPr>
+        <p:txBody>
+          <a:bodyPr wrap="square">
+            <a:spAutoFit/>
+          </a:bodyPr>
+          <a:lstStyle/>
+          <a:p>
+            <a:pPr algn="ctr"/>
+            <a:r>
+              <a:rPr lang="en-US" sz="3600" dirty="0"/>
+              <a:t>Predefining workflow</a:t>
+            </a:r>
+          </a:p>
+        </p:txBody>
+      </p:sp>
+    </p:spTree>
+    <p:extLst>
+      <p:ext uri="{BB962C8B-B14F-4D97-AF65-F5344CB8AC3E}">
+        <p14:creationId xmlns:p14="http://schemas.microsoft.com/office/powerpoint/2010/main" val="3061753476"/>
+      </p:ext>
+    </p:extLst>
+  </p:cSld>
+  <p:clrMapOvr>
+    <a:masterClrMapping/>
+  </p:clrMapOvr>
+  <mc:AlternateContent xmlns:mc="http://schemas.openxmlformats.org/markup-compatibility/2006" xmlns:p14="http://schemas.microsoft.com/office/powerpoint/2010/main">
+    <mc:Choice Requires="p14">
+      <p:transition spd="med" p14:dur="700">
+        <p:fade/>
+      </p:transition>
+    </mc:Choice>
+    <mc:Fallback xmlns="">
+      <p:transition spd="med">
+        <p:fade/>
+      </p:transition>
+    </mc:Fallback>
+  </mc:AlternateContent>
+</p:sld>
+</file>
+
+<file path=ppt/slides/slide8.xml><?xml version="1.0" encoding="utf-8"?>
+<p:sld xmlns:a="http://schemas.openxmlformats.org/drawingml/2006/main" xmlns:r="http://schemas.openxmlformats.org/officeDocument/2006/relationships" xmlns:p="http://schemas.openxmlformats.org/presentationml/2006/main">
+  <p:cSld>
+    <p:spTree>
+      <p:nvGrpSpPr>
+        <p:cNvPr id="1" name=""/>
+        <p:cNvGrpSpPr/>
+        <p:nvPr/>
+      </p:nvGrpSpPr>
+      <p:grpSpPr>
+        <a:xfrm>
+          <a:off x="0" y="0"/>
+          <a:ext cx="0" cy="0"/>
+          <a:chOff x="0" y="0"/>
+          <a:chExt cx="0" cy="0"/>
+        </a:xfrm>
+      </p:grpSpPr>
+      <p:sp>
+        <p:nvSpPr>
+          <p:cNvPr id="2" name="Title 1"/>
+          <p:cNvSpPr>
+            <a:spLocks noGrp="1"/>
+          </p:cNvSpPr>
+          <p:nvPr>
+            <p:ph type="title"/>
+          </p:nvPr>
+        </p:nvSpPr>
+        <p:spPr>
+          <a:xfrm>
+            <a:off x="989012" y="76199"/>
+            <a:ext cx="10157354" cy="1397000"/>
+          </a:xfrm>
+        </p:spPr>
+        <p:txBody>
+          <a:bodyPr/>
+          <a:lstStyle/>
+          <a:p>
+            <a:r>
+              <a:rPr lang="en-US" sz="3600" dirty="0"/>
+              <a:t>PDF Custom Properties</a:t>
+            </a:r>
+            <a:endParaRPr lang="en-US" dirty="0"/>
+          </a:p>
+        </p:txBody>
+      </p:sp>
+      <p:sp>
+        <p:nvSpPr>
+          <p:cNvPr id="7" name="Content Placeholder 4"/>
+          <p:cNvSpPr>
+            <a:spLocks noGrp="1"/>
+          </p:cNvSpPr>
+          <p:nvPr>
+            <p:ph sz="half" idx="1"/>
+          </p:nvPr>
+        </p:nvSpPr>
+        <p:spPr>
+          <a:xfrm>
+            <a:off x="1002804" y="1905000"/>
+            <a:ext cx="8520608" cy="2590800"/>
+          </a:xfrm>
+        </p:spPr>
+        <p:txBody>
+          <a:bodyPr>
+            <a:normAutofit/>
+          </a:bodyPr>
+          <a:lstStyle/>
+          <a:p>
+            <a:r>
+              <a:rPr lang="en-US" sz="2000" dirty="0"/>
+              <a:t>Ability to add custom properties to store specific data</a:t>
+            </a:r>
+          </a:p>
+          <a:p>
+            <a:r>
+              <a:rPr lang="en-US" sz="2000" dirty="0"/>
+              <a:t>ColdFusion can only read custom properties as of 2016 release</a:t>
+            </a:r>
+          </a:p>
+          <a:p>
+            <a:r>
+              <a:rPr lang="en-US" sz="2000" dirty="0"/>
+              <a:t>To Create custom properties we will use JAVA</a:t>
+            </a:r>
+          </a:p>
+          <a:p>
+            <a:r>
+              <a:rPr lang="en-US" sz="2000" dirty="0"/>
+              <a:t>No need to load extra library ColdFusion already has </a:t>
+            </a:r>
+            <a:r>
+              <a:rPr lang="en-US" sz="2000" dirty="0" err="1"/>
+              <a:t>iText</a:t>
+            </a:r>
+            <a:r>
+              <a:rPr lang="en-US" sz="2000" dirty="0"/>
+              <a:t> java library pre-loaded</a:t>
+            </a:r>
+          </a:p>
+          <a:p>
+            <a:endParaRPr lang="en-US" sz="2000" dirty="0"/>
+          </a:p>
+        </p:txBody>
+      </p:sp>
+      <p:sp>
+        <p:nvSpPr>
+          <p:cNvPr id="3" name="Rectangle 2"/>
+          <p:cNvSpPr/>
+          <p:nvPr/>
+        </p:nvSpPr>
+        <p:spPr>
+          <a:xfrm>
+            <a:off x="4341812" y="4648200"/>
+            <a:ext cx="3276600" cy="1200329"/>
+          </a:xfrm>
+          <a:prstGeom prst="rect">
+            <a:avLst/>
+          </a:prstGeom>
+          <a:noFill/>
+        </p:spPr>
+        <p:txBody>
+          <a:bodyPr wrap="square" lIns="91440" tIns="45720" rIns="91440" bIns="45720">
+            <a:spAutoFit/>
+          </a:bodyPr>
+          <a:lstStyle/>
+          <a:p>
+            <a:pPr algn="ctr"/>
+            <a:r>
+              <a:rPr lang="en-US" sz="7200" b="1" cap="none" spc="0" dirty="0">
+                <a:ln w="9525">
+                  <a:solidFill>
+                    <a:schemeClr val="bg1"/>
+                  </a:solidFill>
+                  <a:prstDash val="solid"/>
+                </a:ln>
+                <a:solidFill>
+                  <a:schemeClr val="tx1"/>
+                </a:solidFill>
+                <a:effectLst>
+                  <a:outerShdw blurRad="12700" dist="38100" dir="2700000" algn="tl" rotWithShape="0">
+                    <a:schemeClr val="bg1">
+                      <a:lumMod val="50000"/>
+                    </a:schemeClr>
+                  </a:outerShdw>
+                </a:effectLst>
+              </a:rPr>
+              <a:t>DEMO</a:t>
+            </a:r>
+          </a:p>
+        </p:txBody>
+      </p:sp>
+    </p:spTree>
+    <p:extLst>
+      <p:ext uri="{BB962C8B-B14F-4D97-AF65-F5344CB8AC3E}">
+        <p14:creationId xmlns:p14="http://schemas.microsoft.com/office/powerpoint/2010/main" val="1719536857"/>
+      </p:ext>
+    </p:extLst>
+  </p:cSld>
+  <p:clrMapOvr>
+    <a:masterClrMapping/>
+  </p:clrMapOvr>
+  <mc:AlternateContent xmlns:mc="http://schemas.openxmlformats.org/markup-compatibility/2006" xmlns:p14="http://schemas.microsoft.com/office/powerpoint/2010/main">
+    <mc:Choice Requires="p14">
+      <p:transition spd="med" p14:dur="700">
+        <p:fade/>
+      </p:transition>
+    </mc:Choice>
+    <mc:Fallback xmlns="">
+      <p:transition spd="med">
+        <p:fade/>
+      </p:transition>
+    </mc:Fallback>
+  </mc:AlternateContent>
+</p:sld>
+</file>
+
+<file path=ppt/slides/slide9.xml><?xml version="1.0" encoding="utf-8"?>
+<p:sld xmlns:a="http://schemas.openxmlformats.org/drawingml/2006/main" xmlns:r="http://schemas.openxmlformats.org/officeDocument/2006/relationships" xmlns:p="http://schemas.openxmlformats.org/presentationml/2006/main">
+  <p:cSld>
+    <p:spTree>
+      <p:nvGrpSpPr>
+        <p:cNvPr id="1" name=""/>
+        <p:cNvGrpSpPr/>
+        <p:nvPr/>
+      </p:nvGrpSpPr>
+      <p:grpSpPr>
+        <a:xfrm>
+          <a:off x="0" y="0"/>
+          <a:ext cx="0" cy="0"/>
+          <a:chOff x="0" y="0"/>
+          <a:chExt cx="0" cy="0"/>
+        </a:xfrm>
+      </p:grpSpPr>
+      <p:sp>
+        <p:nvSpPr>
+          <p:cNvPr id="2" name="Title 1"/>
+          <p:cNvSpPr>
+            <a:spLocks noGrp="1"/>
+          </p:cNvSpPr>
+          <p:nvPr>
+            <p:ph type="title"/>
+          </p:nvPr>
+        </p:nvSpPr>
+        <p:spPr/>
+        <p:txBody>
+          <a:bodyPr/>
+          <a:lstStyle/>
+          <a:p>
+            <a:r>
+              <a:rPr lang="en-US" dirty="0"/>
+              <a:t>Title and Content Layout with Chart </a:t>
+            </a:r>
+          </a:p>
+        </p:txBody>
+      </p:sp>
+      <p:graphicFrame>
+        <p:nvGraphicFramePr>
+          <p:cNvPr id="7" name="Content Placeholder 6" descr="Line" title="Chart"/>
+          <p:cNvGraphicFramePr>
+            <a:graphicFrameLocks noGrp="1"/>
+          </p:cNvGraphicFramePr>
+          <p:nvPr>
+            <p:ph idx="1"/>
+            <p:extLst>
+              <p:ext uri="{D42A27DB-BD31-4B8C-83A1-F6EECF244321}">
+                <p14:modId xmlns:p14="http://schemas.microsoft.com/office/powerpoint/2010/main" val="2432020898"/>
+              </p:ext>
+            </p:extLst>
+          </p:nvPr>
+        </p:nvGraphicFramePr>
+        <p:xfrm>
+          <a:off x="1117600" y="1701800"/>
+          <a:ext cx="10156825" cy="4470400"/>
+        </p:xfrm>
+        <a:graphic>
+          <a:graphicData uri="http://schemas.openxmlformats.org/drawingml/2006/chart">
+            <c:chart xmlns:c="http://schemas.openxmlformats.org/drawingml/2006/chart" xmlns:r="http://schemas.openxmlformats.org/officeDocument/2006/relationships" r:id="rId2"/>
+          </a:graphicData>
+        </a:graphic>
+      </p:graphicFrame>
+    </p:spTree>
+    <p:extLst>
+      <p:ext uri="{BB962C8B-B14F-4D97-AF65-F5344CB8AC3E}">
+        <p14:creationId xmlns:p14="http://schemas.microsoft.com/office/powerpoint/2010/main" val="2474917317"/>
       </p:ext>
     </p:extLst>
   </p:cSld>

</xml_diff>